<commit_message>
poster figures and poster
</commit_message>
<xml_diff>
--- a/lab_docs/PRISM 2014 Poster.pptx
+++ b/lab_docs/PRISM 2014 Poster.pptx
@@ -109,7 +109,7 @@
   </p:defaultTextStyle>
   <p:extLst>
     <p:ext uri="{EFAFB233-063F-42B5-8137-9DF3F51BA10A}">
-      <p15:sldGuideLst xmlns:p15="http://schemas.microsoft.com/office/powerpoint/2012/main">
+      <p15:sldGuideLst xmlns:p15="http://schemas.microsoft.com/office/powerpoint/2012/main" xmlns="">
         <p15:guide id="1" orient="horz" pos="11808">
           <p15:clr>
             <a:srgbClr val="A4A3A4"/>
@@ -209,7 +209,7 @@
             <a:fld id="{2ED31651-4051-C246-8294-EECC65F65378}" type="datetimeFigureOut">
               <a:rPr lang="en-US" smtClean="0"/>
               <a:pPr/>
-              <a:t>7/9/2014</a:t>
+              <a:t>7/10/14</a:t>
             </a:fld>
             <a:endParaRPr lang="en-US"/>
           </a:p>
@@ -745,7 +745,7 @@
             <a:fld id="{81028B0D-4809-CB40-AD2C-19339D999798}" type="datetimeFigureOut">
               <a:rPr lang="en-US" smtClean="0"/>
               <a:pPr/>
-              <a:t>7/9/2014</a:t>
+              <a:t>7/10/14</a:t>
             </a:fld>
             <a:endParaRPr lang="en-US"/>
           </a:p>
@@ -917,7 +917,7 @@
             <a:fld id="{81028B0D-4809-CB40-AD2C-19339D999798}" type="datetimeFigureOut">
               <a:rPr lang="en-US" smtClean="0"/>
               <a:pPr/>
-              <a:t>7/9/2014</a:t>
+              <a:t>7/10/14</a:t>
             </a:fld>
             <a:endParaRPr lang="en-US"/>
           </a:p>
@@ -1099,7 +1099,7 @@
             <a:fld id="{81028B0D-4809-CB40-AD2C-19339D999798}" type="datetimeFigureOut">
               <a:rPr lang="en-US" smtClean="0"/>
               <a:pPr/>
-              <a:t>7/9/2014</a:t>
+              <a:t>7/10/14</a:t>
             </a:fld>
             <a:endParaRPr lang="en-US"/>
           </a:p>
@@ -1271,7 +1271,7 @@
             <a:fld id="{81028B0D-4809-CB40-AD2C-19339D999798}" type="datetimeFigureOut">
               <a:rPr lang="en-US" smtClean="0"/>
               <a:pPr/>
-              <a:t>7/9/2014</a:t>
+              <a:t>7/10/14</a:t>
             </a:fld>
             <a:endParaRPr lang="en-US"/>
           </a:p>
@@ -1519,7 +1519,7 @@
             <a:fld id="{81028B0D-4809-CB40-AD2C-19339D999798}" type="datetimeFigureOut">
               <a:rPr lang="en-US" smtClean="0"/>
               <a:pPr/>
-              <a:t>7/9/2014</a:t>
+              <a:t>7/10/14</a:t>
             </a:fld>
             <a:endParaRPr lang="en-US"/>
           </a:p>
@@ -1809,7 +1809,7 @@
             <a:fld id="{81028B0D-4809-CB40-AD2C-19339D999798}" type="datetimeFigureOut">
               <a:rPr lang="en-US" smtClean="0"/>
               <a:pPr/>
-              <a:t>7/9/2014</a:t>
+              <a:t>7/10/14</a:t>
             </a:fld>
             <a:endParaRPr lang="en-US"/>
           </a:p>
@@ -2233,7 +2233,7 @@
             <a:fld id="{81028B0D-4809-CB40-AD2C-19339D999798}" type="datetimeFigureOut">
               <a:rPr lang="en-US" smtClean="0"/>
               <a:pPr/>
-              <a:t>7/9/2014</a:t>
+              <a:t>7/10/14</a:t>
             </a:fld>
             <a:endParaRPr lang="en-US"/>
           </a:p>
@@ -2353,7 +2353,7 @@
             <a:fld id="{81028B0D-4809-CB40-AD2C-19339D999798}" type="datetimeFigureOut">
               <a:rPr lang="en-US" smtClean="0"/>
               <a:pPr/>
-              <a:t>7/9/2014</a:t>
+              <a:t>7/10/14</a:t>
             </a:fld>
             <a:endParaRPr lang="en-US"/>
           </a:p>
@@ -2450,7 +2450,7 @@
             <a:fld id="{81028B0D-4809-CB40-AD2C-19339D999798}" type="datetimeFigureOut">
               <a:rPr lang="en-US" smtClean="0"/>
               <a:pPr/>
-              <a:t>7/9/2014</a:t>
+              <a:t>7/10/14</a:t>
             </a:fld>
             <a:endParaRPr lang="en-US"/>
           </a:p>
@@ -2729,7 +2729,7 @@
             <a:fld id="{81028B0D-4809-CB40-AD2C-19339D999798}" type="datetimeFigureOut">
               <a:rPr lang="en-US" smtClean="0"/>
               <a:pPr/>
-              <a:t>7/9/2014</a:t>
+              <a:t>7/10/14</a:t>
             </a:fld>
             <a:endParaRPr lang="en-US"/>
           </a:p>
@@ -2984,7 +2984,7 @@
             <a:fld id="{81028B0D-4809-CB40-AD2C-19339D999798}" type="datetimeFigureOut">
               <a:rPr lang="en-US" smtClean="0"/>
               <a:pPr/>
-              <a:t>7/9/2014</a:t>
+              <a:t>7/10/14</a:t>
             </a:fld>
             <a:endParaRPr lang="en-US"/>
           </a:p>
@@ -3199,7 +3199,7 @@
             <a:fld id="{81028B0D-4809-CB40-AD2C-19339D999798}" type="datetimeFigureOut">
               <a:rPr lang="en-US" smtClean="0"/>
               <a:pPr/>
-              <a:t>7/9/2014</a:t>
+              <a:t>7/10/14</a:t>
             </a:fld>
             <a:endParaRPr lang="en-US"/>
           </a:p>
@@ -3591,8 +3591,8 @@
         </p:blipFill>
         <p:spPr>
           <a:xfrm>
-            <a:off x="1082752" y="796524"/>
-            <a:ext cx="3728614" cy="3536169"/>
+            <a:off x="1198334" y="1170895"/>
+            <a:ext cx="2506635" cy="2377260"/>
           </a:xfrm>
           <a:prstGeom prst="rect">
             <a:avLst/>
@@ -3607,10 +3607,10 @@
         </p:nvGrpSpPr>
         <p:grpSpPr>
           <a:xfrm>
-            <a:off x="0" y="901055"/>
-            <a:ext cx="36628099" cy="4163238"/>
-            <a:chOff x="4476622" y="907149"/>
-            <a:chExt cx="39224371" cy="4366323"/>
+            <a:off x="4266495" y="1170895"/>
+            <a:ext cx="28039133" cy="3575352"/>
+            <a:chOff x="9045534" y="1190152"/>
+            <a:chExt cx="30026602" cy="3749760"/>
           </a:xfrm>
         </p:grpSpPr>
         <p:sp>
@@ -3621,7 +3621,7 @@
           </p:nvSpPr>
           <p:spPr>
             <a:xfrm>
-              <a:off x="9120089" y="907149"/>
+              <a:off x="9045534" y="1190152"/>
               <a:ext cx="30026602" cy="2033577"/>
             </a:xfrm>
             <a:prstGeom prst="rect">
@@ -3641,21 +3641,21 @@
                   <a:latin typeface="Helvetica"/>
                   <a:cs typeface="Helvetica"/>
                 </a:rPr>
-                <a:t>THE </a:t>
+                <a:t>THE EFFECTS OF </a:t>
               </a:r>
               <a:r>
                 <a:rPr lang="en-US" sz="6000" dirty="0" smtClean="0">
                   <a:latin typeface="Helvetica"/>
                   <a:cs typeface="Helvetica"/>
                 </a:rPr>
-                <a:t>EFFECTS</a:t>
+                <a:t>LEAF LITTER AND NUTRIENTS ON </a:t>
               </a:r>
               <a:r>
                 <a:rPr lang="en-US" sz="6000" dirty="0" smtClean="0">
                   <a:latin typeface="Helvetica"/>
                   <a:cs typeface="Helvetica"/>
                 </a:rPr>
-                <a:t> OF ALLOCHTHONOUS DETRITUS ON SEDIMENT OXYGEN DEMAND IN A MAN-MADE POND IN CENTRAL VIRGINIA</a:t>
+                <a:t>SEDIMENT OXYGEN DEMAND IN A MAN-MADE POND IN CENTRAL VIRGINIA</a:t>
               </a:r>
               <a:endParaRPr lang="en-US" sz="6000" dirty="0">
                 <a:latin typeface="Helvetica"/>
@@ -3672,10 +3672,10 @@
           </p:nvGrpSpPr>
           <p:grpSpPr>
             <a:xfrm>
-              <a:off x="4476622" y="3223729"/>
-              <a:ext cx="39224371" cy="2049743"/>
-              <a:chOff x="4430210" y="3452329"/>
-              <a:chExt cx="39224371" cy="2049743"/>
+              <a:off x="17567026" y="3223729"/>
+              <a:ext cx="13559328" cy="1716183"/>
+              <a:chOff x="17520614" y="3452329"/>
+              <a:chExt cx="13559328" cy="1716183"/>
             </a:xfrm>
           </p:grpSpPr>
           <p:sp>
@@ -3686,8 +3686,8 @@
             </p:nvSpPr>
             <p:spPr>
               <a:xfrm>
-                <a:off x="4430210" y="3452329"/>
-                <a:ext cx="39224371" cy="968371"/>
+                <a:off x="17520614" y="3452329"/>
+                <a:ext cx="13559328" cy="968371"/>
               </a:xfrm>
               <a:prstGeom prst="rect">
                 <a:avLst/>
@@ -3711,11 +3711,15 @@
                 </a:r>
                 <a:r>
                   <a:rPr lang="en-US" sz="5400" dirty="0" smtClean="0"/>
-                  <a:t>Peters and Dr. </a:t>
+                  <a:t>Peters </a:t>
+                </a:r>
+                <a:r>
+                  <a:rPr lang="en-US" sz="5400" dirty="0" smtClean="0"/>
+                  <a:t>and Kenneth </a:t>
                 </a:r>
                 <a:r>
                   <a:rPr lang="en-US" sz="5400" dirty="0"/>
-                  <a:t>Kenneth Fortino</a:t>
+                  <a:t>Fortino</a:t>
                 </a:r>
               </a:p>
             </p:txBody>
@@ -3728,8 +3732,8 @@
             </p:nvSpPr>
             <p:spPr>
               <a:xfrm>
-                <a:off x="17308544" y="4486409"/>
-                <a:ext cx="13261383" cy="1015663"/>
+                <a:off x="17648552" y="4361537"/>
+                <a:ext cx="13261383" cy="806975"/>
               </a:xfrm>
               <a:prstGeom prst="rect">
                 <a:avLst/>
@@ -3742,19 +3746,20 @@
               </a:bodyPr>
               <a:lstStyle/>
               <a:p>
+                <a:pPr algn="ctr"/>
                 <a:r>
-                  <a:rPr lang="en-US" sz="5700" dirty="0"/>
+                  <a:rPr lang="en-US" sz="4400" dirty="0"/>
                   <a:t>Longwood University, </a:t>
                 </a:r>
                 <a:r>
-                  <a:rPr lang="en-US" sz="5700" dirty="0" smtClean="0"/>
+                  <a:rPr lang="en-US" sz="4400" dirty="0" smtClean="0"/>
                   <a:t>Farmville, </a:t>
                 </a:r>
                 <a:r>
-                  <a:rPr lang="en-US" sz="5700" dirty="0" err="1"/>
+                  <a:rPr lang="en-US" sz="4400" dirty="0" err="1"/>
                   <a:t>Va</a:t>
                 </a:r>
-                <a:endParaRPr lang="en-US" sz="5700" dirty="0"/>
+                <a:endParaRPr lang="en-US" sz="4400" dirty="0"/>
               </a:p>
             </p:txBody>
           </p:sp>
@@ -3982,8 +3987,8 @@
         </p:nvSpPr>
         <p:spPr>
           <a:xfrm>
-            <a:off x="26180645" y="30218270"/>
-            <a:ext cx="9808535" cy="2919574"/>
+            <a:off x="29652051" y="21334741"/>
+            <a:ext cx="6483315" cy="3396627"/>
           </a:xfrm>
           <a:prstGeom prst="rect">
             <a:avLst/>
@@ -3996,19 +4001,23 @@
           </a:bodyPr>
           <a:lstStyle/>
           <a:p>
-            <a:pPr algn="ctr"/>
-            <a:endParaRPr lang="en-US" sz="3800" dirty="0">
-              <a:latin typeface="Helvetica"/>
-              <a:cs typeface="Helvetica"/>
-            </a:endParaRPr>
-          </a:p>
-          <a:p>
+            <a:pPr marL="342900" indent="-342900">
+              <a:buFont typeface="Arial"/>
+              <a:buChar char="•"/>
+            </a:pPr>
+            <a:r>
+              <a:rPr lang="en-US" sz="2300" dirty="0" smtClean="0">
+                <a:latin typeface="Helvetica"/>
+                <a:cs typeface="Helvetica"/>
+              </a:rPr>
+              <a:t>What </a:t>
+            </a:r>
             <a:r>
               <a:rPr lang="en-US" sz="2300" dirty="0">
                 <a:latin typeface="Helvetica"/>
                 <a:cs typeface="Helvetica"/>
               </a:rPr>
-              <a:t>What is the contribution of leaf litter to </a:t>
+              <a:t>is the contribution of leaf litter to </a:t>
             </a:r>
             <a:r>
               <a:rPr lang="en-US" sz="2300" dirty="0" smtClean="0">
@@ -4023,6 +4032,29 @@
                 <a:cs typeface="Helvetica"/>
               </a:rPr>
               <a:t>?</a:t>
+            </a:r>
+          </a:p>
+          <a:p>
+            <a:pPr marL="342900" indent="-342900">
+              <a:buFont typeface="Arial"/>
+              <a:buChar char="•"/>
+            </a:pPr>
+            <a:endParaRPr lang="en-US" sz="2300" dirty="0">
+              <a:latin typeface="Helvetica"/>
+              <a:cs typeface="Helvetica"/>
+            </a:endParaRPr>
+          </a:p>
+          <a:p>
+            <a:pPr marL="342900" indent="-342900">
+              <a:buFont typeface="Arial"/>
+              <a:buChar char="•"/>
+            </a:pPr>
+            <a:r>
+              <a:rPr lang="en-US" sz="2300" dirty="0" err="1" smtClean="0">
+                <a:latin typeface="Helvetica"/>
+                <a:cs typeface="Helvetica"/>
+              </a:rPr>
+              <a:t>th</a:t>
             </a:r>
             <a:endParaRPr lang="en-US" sz="2300" dirty="0">
               <a:latin typeface="Helvetica"/>
@@ -4060,151 +4092,6 @@
           </a:p>
         </p:txBody>
       </p:sp>
-      <p:sp>
-        <p:nvSpPr>
-          <p:cNvPr id="63" name="TextBox 62"/>
-          <p:cNvSpPr txBox="1"/>
-          <p:nvPr/>
-        </p:nvSpPr>
-        <p:spPr>
-          <a:xfrm>
-            <a:off x="26711530" y="12716303"/>
-            <a:ext cx="9862243" cy="6001643"/>
-          </a:xfrm>
-          <a:prstGeom prst="rect">
-            <a:avLst/>
-          </a:prstGeom>
-          <a:noFill/>
-        </p:spPr>
-        <p:txBody>
-          <a:bodyPr wrap="square" rtlCol="0">
-            <a:spAutoFit/>
-          </a:bodyPr>
-          <a:lstStyle/>
-          <a:p>
-            <a:pPr marL="272434" indent="-272434" algn="just">
-              <a:buFont typeface="Arial"/>
-              <a:buChar char="•"/>
-            </a:pPr>
-            <a:r>
-              <a:rPr lang="en-US" sz="2400" dirty="0" smtClean="0">
-                <a:latin typeface="Times"/>
-                <a:cs typeface="Times"/>
-              </a:rPr>
-              <a:t>A factorial design was creating using CPOM and nutrient enrichment treatments</a:t>
-            </a:r>
-          </a:p>
-          <a:p>
-            <a:pPr marL="272434" indent="-272434" algn="just">
-              <a:buFont typeface="Arial"/>
-              <a:buChar char="•"/>
-            </a:pPr>
-            <a:r>
-              <a:rPr lang="en-US" sz="2400" dirty="0" smtClean="0">
-                <a:latin typeface="Times"/>
-                <a:cs typeface="Times"/>
-              </a:rPr>
-              <a:t>Sediment samples were collected 29 May 2014 from Lancer Park Pond using an </a:t>
-            </a:r>
-            <a:r>
-              <a:rPr lang="en-US" sz="2400" dirty="0" err="1" smtClean="0">
-                <a:latin typeface="Times"/>
-                <a:cs typeface="Times"/>
-              </a:rPr>
-              <a:t>eckman</a:t>
-            </a:r>
-            <a:r>
-              <a:rPr lang="en-US" sz="2400" dirty="0" smtClean="0">
-                <a:latin typeface="Times"/>
-                <a:cs typeface="Times"/>
-              </a:rPr>
-              <a:t>-dredge</a:t>
-            </a:r>
-          </a:p>
-          <a:p>
-            <a:pPr marL="272434" indent="-272434" algn="just">
-              <a:buFont typeface="Arial"/>
-              <a:buChar char="•"/>
-            </a:pPr>
-            <a:r>
-              <a:rPr lang="en-US" sz="2400" dirty="0" smtClean="0">
-                <a:latin typeface="Times"/>
-                <a:cs typeface="Times"/>
-              </a:rPr>
-              <a:t>Replacement water samples were collected 9 June 2014 from Lancer Park Pond by submersion at Z=0.5m </a:t>
-            </a:r>
-          </a:p>
-          <a:p>
-            <a:pPr marL="272434" indent="-272434" algn="just">
-              <a:buFont typeface="Arial"/>
-              <a:buChar char="•"/>
-            </a:pPr>
-            <a:r>
-              <a:rPr lang="en-US" sz="2400" dirty="0" smtClean="0">
-                <a:latin typeface="Times"/>
-                <a:cs typeface="Times"/>
-              </a:rPr>
-              <a:t>BOD bottles were loaded with 100ml of sediment slurry and 200ml of replacement water</a:t>
-            </a:r>
-          </a:p>
-          <a:p>
-            <a:pPr marL="272434" indent="-272434" algn="just">
-              <a:buFont typeface="Arial"/>
-              <a:buChar char="•"/>
-            </a:pPr>
-            <a:r>
-              <a:rPr lang="en-US" sz="2400" dirty="0" smtClean="0">
-                <a:latin typeface="Times"/>
-                <a:cs typeface="Times"/>
-              </a:rPr>
-              <a:t>Nutrient enrichment treatments were created by adding 300 micrograms/liter of DIN and 30 micrograms/ liter of DIP to the replacement water</a:t>
-            </a:r>
-          </a:p>
-          <a:p>
-            <a:pPr marL="272434" indent="-272434" algn="just">
-              <a:buFont typeface="Arial"/>
-              <a:buChar char="•"/>
-            </a:pPr>
-            <a:r>
-              <a:rPr lang="en-US" sz="2400" dirty="0" smtClean="0">
-                <a:latin typeface="Times"/>
-                <a:cs typeface="Times"/>
-              </a:rPr>
-              <a:t>The CPOM treatments were created by adding 20 leaf disks of 10 mm diameter to each CPOM treatment bottle</a:t>
-            </a:r>
-          </a:p>
-          <a:p>
-            <a:pPr marL="272434" indent="-272434" algn="just">
-              <a:buFont typeface="Arial"/>
-              <a:buChar char="•"/>
-            </a:pPr>
-            <a:r>
-              <a:rPr lang="en-US" sz="2400" dirty="0" smtClean="0">
-                <a:latin typeface="Times"/>
-                <a:cs typeface="Times"/>
-              </a:rPr>
-              <a:t>Sediment oxygen demand was determined using the Winkler’s Method (Carpenter 1965)</a:t>
-            </a:r>
-            <a:endParaRPr lang="en-US" sz="2400" dirty="0">
-              <a:latin typeface="Times"/>
-              <a:cs typeface="Times"/>
-            </a:endParaRPr>
-          </a:p>
-          <a:p>
-            <a:pPr marL="272434" indent="-272434" algn="just">
-              <a:buFont typeface="Arial"/>
-              <a:buChar char="•"/>
-            </a:pPr>
-            <a:r>
-              <a:rPr lang="en-US" sz="2400" dirty="0" smtClean="0">
-                <a:latin typeface="Times"/>
-                <a:cs typeface="Times"/>
-              </a:rPr>
-              <a:t>The proportion of organic matter in the sediments and CPOM was determined by loss upon ignition.</a:t>
-            </a:r>
-          </a:p>
-        </p:txBody>
-      </p:sp>
       <p:grpSp>
         <p:nvGrpSpPr>
           <p:cNvPr id="3" name="Group 2"/>
@@ -4213,10 +4100,10 @@
         </p:nvGrpSpPr>
         <p:grpSpPr>
           <a:xfrm>
-            <a:off x="101352" y="17960892"/>
-            <a:ext cx="10206635" cy="10621533"/>
-            <a:chOff x="432648" y="17734885"/>
-            <a:chExt cx="11022448" cy="16688041"/>
+            <a:off x="512325" y="18050164"/>
+            <a:ext cx="8832055" cy="10587659"/>
+            <a:chOff x="432648" y="18772863"/>
+            <a:chExt cx="11022448" cy="16031431"/>
           </a:xfrm>
         </p:grpSpPr>
         <p:sp>
@@ -4227,8 +4114,8 @@
           </p:nvSpPr>
           <p:spPr>
             <a:xfrm>
-              <a:off x="1617311" y="27314540"/>
-              <a:ext cx="9194544" cy="7108386"/>
+              <a:off x="1288791" y="27314540"/>
+              <a:ext cx="9523064" cy="7489754"/>
             </a:xfrm>
             <a:prstGeom prst="rect">
               <a:avLst/>
@@ -4290,38 +4177,6 @@
                   <a:cs typeface="Times"/>
                 </a:rPr>
                 <a:t> et al. 1999).</a:t>
-              </a:r>
-            </a:p>
-          </p:txBody>
-        </p:sp>
-        <p:sp>
-          <p:nvSpPr>
-            <p:cNvPr id="26" name="TextBox 25"/>
-            <p:cNvSpPr txBox="1"/>
-            <p:nvPr/>
-          </p:nvSpPr>
-          <p:spPr>
-            <a:xfrm>
-              <a:off x="1173597" y="17734885"/>
-              <a:ext cx="9194544" cy="707886"/>
-            </a:xfrm>
-            <a:prstGeom prst="rect">
-              <a:avLst/>
-            </a:prstGeom>
-            <a:noFill/>
-          </p:spPr>
-          <p:txBody>
-            <a:bodyPr wrap="none" rtlCol="0">
-              <a:spAutoFit/>
-            </a:bodyPr>
-            <a:lstStyle/>
-            <a:p>
-              <a:r>
-                <a:rPr lang="en-US" sz="3800" dirty="0">
-                  <a:latin typeface="Helvetica"/>
-                  <a:cs typeface="Helvetica"/>
-                </a:rPr>
-                <a:t>Leaf litter provides resources for ponds.</a:t>
               </a:r>
             </a:p>
           </p:txBody>
@@ -4379,8 +4234,8 @@
         </p:blipFill>
         <p:spPr>
           <a:xfrm>
-            <a:off x="28450765" y="1263466"/>
-            <a:ext cx="8687734" cy="3924205"/>
+            <a:off x="32410067" y="1305871"/>
+            <a:ext cx="4599973" cy="2077784"/>
           </a:xfrm>
           <a:prstGeom prst="rect">
             <a:avLst/>
@@ -4389,88 +4244,407 @@
       </p:pic>
       <p:grpSp>
         <p:nvGrpSpPr>
-          <p:cNvPr id="14" name="Group 13"/>
+          <p:cNvPr id="64" name="Group 63"/>
           <p:cNvGrpSpPr/>
           <p:nvPr/>
         </p:nvGrpSpPr>
         <p:grpSpPr>
           <a:xfrm>
-            <a:off x="26726017" y="19518596"/>
-            <a:ext cx="9808535" cy="3409446"/>
-            <a:chOff x="469453" y="16201696"/>
-            <a:chExt cx="9348238" cy="4017591"/>
+            <a:off x="9653365" y="29758122"/>
+            <a:ext cx="10033063" cy="7331744"/>
+            <a:chOff x="11014685" y="7146937"/>
+            <a:chExt cx="10890348" cy="7997463"/>
           </a:xfrm>
         </p:grpSpPr>
-        <p:pic>
-          <p:nvPicPr>
-            <p:cNvPr id="16" name="Picture 15"/>
-            <p:cNvPicPr>
-              <a:picLocks noChangeAspect="1"/>
-            </p:cNvPicPr>
+        <p:grpSp>
+          <p:nvGrpSpPr>
+            <p:cNvPr id="14" name="Group 13"/>
+            <p:cNvGrpSpPr/>
             <p:nvPr/>
-          </p:nvPicPr>
-          <p:blipFill>
-            <a:blip r:embed="rId6">
-              <a:extLst>
-                <a:ext uri="{28A0092B-C50C-407E-A947-70E740481C1C}">
-                  <a14:useLocalDpi xmlns:a14="http://schemas.microsoft.com/office/drawing/2010/main" val="0"/>
-                </a:ext>
-              </a:extLst>
-            </a:blip>
-            <a:stretch>
-              <a:fillRect/>
-            </a:stretch>
-          </p:blipFill>
-          <p:spPr>
+          </p:nvGrpSpPr>
+          <p:grpSpPr>
             <a:xfrm>
-              <a:off x="924894" y="16201696"/>
-              <a:ext cx="2931291" cy="2320583"/>
+              <a:off x="11236109" y="11734954"/>
+              <a:ext cx="9808535" cy="3409446"/>
+              <a:chOff x="469453" y="16201696"/>
+              <a:chExt cx="9348238" cy="4017591"/>
             </a:xfrm>
-            <a:prstGeom prst="rect">
-              <a:avLst/>
-            </a:prstGeom>
-          </p:spPr>
-        </p:pic>
-        <p:pic>
-          <p:nvPicPr>
-            <p:cNvPr id="17" name="Picture 16"/>
-            <p:cNvPicPr>
-              <a:picLocks noChangeAspect="1"/>
-            </p:cNvPicPr>
+          </p:grpSpPr>
+          <p:pic>
+            <p:nvPicPr>
+              <p:cNvPr id="16" name="Picture 15"/>
+              <p:cNvPicPr>
+                <a:picLocks noChangeAspect="1"/>
+              </p:cNvPicPr>
+              <p:nvPr/>
+            </p:nvPicPr>
+            <p:blipFill>
+              <a:blip r:embed="rId6">
+                <a:extLst>
+                  <a:ext uri="{28A0092B-C50C-407E-A947-70E740481C1C}">
+                    <a14:useLocalDpi xmlns:a14="http://schemas.microsoft.com/office/drawing/2010/main" val="0"/>
+                  </a:ext>
+                </a:extLst>
+              </a:blip>
+              <a:stretch>
+                <a:fillRect/>
+              </a:stretch>
+            </p:blipFill>
+            <p:spPr>
+              <a:xfrm>
+                <a:off x="924894" y="16201696"/>
+                <a:ext cx="2931291" cy="2320583"/>
+              </a:xfrm>
+              <a:prstGeom prst="rect">
+                <a:avLst/>
+              </a:prstGeom>
+            </p:spPr>
+          </p:pic>
+          <p:pic>
+            <p:nvPicPr>
+              <p:cNvPr id="17" name="Picture 16"/>
+              <p:cNvPicPr>
+                <a:picLocks noChangeAspect="1"/>
+              </p:cNvPicPr>
+              <p:nvPr/>
+            </p:nvPicPr>
+            <p:blipFill>
+              <a:blip r:embed="rId7">
+                <a:extLst>
+                  <a:ext uri="{28A0092B-C50C-407E-A947-70E740481C1C}">
+                    <a14:useLocalDpi xmlns:a14="http://schemas.microsoft.com/office/drawing/2010/main" val="0"/>
+                  </a:ext>
+                </a:extLst>
+              </a:blip>
+              <a:stretch>
+                <a:fillRect/>
+              </a:stretch>
+            </p:blipFill>
+            <p:spPr>
+              <a:xfrm>
+                <a:off x="5659040" y="16201696"/>
+                <a:ext cx="2931291" cy="2320583"/>
+              </a:xfrm>
+              <a:prstGeom prst="rect">
+                <a:avLst/>
+              </a:prstGeom>
+            </p:spPr>
+          </p:pic>
+          <p:sp>
+            <p:nvSpPr>
+              <p:cNvPr id="55" name="TextBox 54"/>
+              <p:cNvSpPr txBox="1"/>
+              <p:nvPr/>
+            </p:nvSpPr>
+            <p:spPr>
+              <a:xfrm>
+                <a:off x="469453" y="19240064"/>
+                <a:ext cx="9348238" cy="979223"/>
+              </a:xfrm>
+              <a:prstGeom prst="rect">
+                <a:avLst/>
+              </a:prstGeom>
+              <a:noFill/>
+            </p:spPr>
+            <p:txBody>
+              <a:bodyPr wrap="square" rtlCol="0">
+                <a:spAutoFit/>
+              </a:bodyPr>
+              <a:lstStyle/>
+              <a:p>
+                <a:r>
+                  <a:rPr lang="en-US" sz="2400" dirty="0" smtClean="0">
+                    <a:latin typeface="Times" panose="02020603050405020304" pitchFamily="18" charset="0"/>
+                    <a:cs typeface="Times" panose="02020603050405020304" pitchFamily="18" charset="0"/>
+                  </a:rPr>
+                  <a:t>Figure </a:t>
+                </a:r>
+                <a:r>
+                  <a:rPr lang="en-US" sz="2400" dirty="0">
+                    <a:latin typeface="Times" panose="02020603050405020304" pitchFamily="18" charset="0"/>
+                    <a:cs typeface="Times" panose="02020603050405020304" pitchFamily="18" charset="0"/>
+                  </a:rPr>
+                  <a:t>2</a:t>
+                </a:r>
+                <a:r>
+                  <a:rPr lang="en-US" sz="2400" dirty="0" smtClean="0">
+                    <a:latin typeface="Times" panose="02020603050405020304" pitchFamily="18" charset="0"/>
+                    <a:cs typeface="Times" panose="02020603050405020304" pitchFamily="18" charset="0"/>
+                  </a:rPr>
+                  <a:t>: </a:t>
+                </a:r>
+                <a:r>
+                  <a:rPr lang="en-US" sz="2400" dirty="0" smtClean="0">
+                    <a:latin typeface="Times" panose="02020603050405020304" pitchFamily="18" charset="0"/>
+                    <a:cs typeface="Times" panose="02020603050405020304" pitchFamily="18" charset="0"/>
+                  </a:rPr>
+                  <a:t>A. An example of a BOD bottle with CPOM present. B. An example of a BOD bottle without CPOM.</a:t>
+                </a:r>
+                <a:endParaRPr lang="en-US" sz="2400" dirty="0">
+                  <a:latin typeface="Times" panose="02020603050405020304" pitchFamily="18" charset="0"/>
+                  <a:cs typeface="Times" panose="02020603050405020304" pitchFamily="18" charset="0"/>
+                </a:endParaRPr>
+              </a:p>
+            </p:txBody>
+          </p:sp>
+          <p:sp>
+            <p:nvSpPr>
+              <p:cNvPr id="56" name="TextBox 55"/>
+              <p:cNvSpPr txBox="1"/>
+              <p:nvPr/>
+            </p:nvSpPr>
+            <p:spPr>
+              <a:xfrm>
+                <a:off x="3233694" y="17938215"/>
+                <a:ext cx="462529" cy="471478"/>
+              </a:xfrm>
+              <a:prstGeom prst="rect">
+                <a:avLst/>
+              </a:prstGeom>
+              <a:noFill/>
+            </p:spPr>
+            <p:txBody>
+              <a:bodyPr wrap="square" rtlCol="0">
+                <a:spAutoFit/>
+              </a:bodyPr>
+              <a:lstStyle/>
+              <a:p>
+                <a:r>
+                  <a:rPr lang="en-US" sz="2000" dirty="0" smtClean="0"/>
+                  <a:t>A</a:t>
+                </a:r>
+                <a:endParaRPr lang="en-US" sz="2000" dirty="0"/>
+              </a:p>
+            </p:txBody>
+          </p:sp>
+          <p:sp>
+            <p:nvSpPr>
+              <p:cNvPr id="73" name="TextBox 72"/>
+              <p:cNvSpPr txBox="1"/>
+              <p:nvPr/>
+            </p:nvSpPr>
+            <p:spPr>
+              <a:xfrm>
+                <a:off x="8084515" y="17994297"/>
+                <a:ext cx="346469" cy="471478"/>
+              </a:xfrm>
+              <a:prstGeom prst="rect">
+                <a:avLst/>
+              </a:prstGeom>
+              <a:noFill/>
+            </p:spPr>
+            <p:txBody>
+              <a:bodyPr wrap="square" rtlCol="0">
+                <a:spAutoFit/>
+              </a:bodyPr>
+              <a:lstStyle/>
+              <a:p>
+                <a:r>
+                  <a:rPr lang="en-US" sz="2000" dirty="0" smtClean="0"/>
+                  <a:t>B</a:t>
+                </a:r>
+                <a:endParaRPr lang="en-US" sz="2000" dirty="0"/>
+              </a:p>
+            </p:txBody>
+          </p:sp>
+        </p:grpSp>
+        <p:grpSp>
+          <p:nvGrpSpPr>
+            <p:cNvPr id="49" name="Group 48"/>
+            <p:cNvGrpSpPr/>
             <p:nvPr/>
-          </p:nvPicPr>
-          <p:blipFill>
-            <a:blip r:embed="rId7">
-              <a:extLst>
-                <a:ext uri="{28A0092B-C50C-407E-A947-70E740481C1C}">
-                  <a14:useLocalDpi xmlns:a14="http://schemas.microsoft.com/office/drawing/2010/main" val="0"/>
-                </a:ext>
-              </a:extLst>
-            </a:blip>
-            <a:stretch>
-              <a:fillRect/>
-            </a:stretch>
-          </p:blipFill>
-          <p:spPr>
+          </p:nvGrpSpPr>
+          <p:grpSpPr>
             <a:xfrm>
-              <a:off x="5659040" y="16201696"/>
-              <a:ext cx="2931291" cy="2320583"/>
+              <a:off x="11014685" y="7146937"/>
+              <a:ext cx="10890348" cy="3932923"/>
+              <a:chOff x="26248152" y="18090567"/>
+              <a:chExt cx="10890348" cy="3932923"/>
             </a:xfrm>
-            <a:prstGeom prst="rect">
-              <a:avLst/>
-            </a:prstGeom>
-          </p:spPr>
-        </p:pic>
+          </p:grpSpPr>
+          <p:pic>
+            <p:nvPicPr>
+              <p:cNvPr id="1029" name="Picture 5"/>
+              <p:cNvPicPr>
+                <a:picLocks noChangeAspect="1" noChangeArrowheads="1"/>
+              </p:cNvPicPr>
+              <p:nvPr/>
+            </p:nvPicPr>
+            <p:blipFill>
+              <a:blip r:embed="rId8"/>
+              <a:srcRect/>
+              <a:stretch>
+                <a:fillRect/>
+              </a:stretch>
+            </p:blipFill>
+            <p:spPr bwMode="auto">
+              <a:xfrm>
+                <a:off x="31464920" y="18090568"/>
+                <a:ext cx="4097090" cy="2436406"/>
+              </a:xfrm>
+              <a:prstGeom prst="rect">
+                <a:avLst/>
+              </a:prstGeom>
+              <a:noFill/>
+              <a:ln w="9525">
+                <a:noFill/>
+                <a:miter lim="800000"/>
+                <a:headEnd/>
+                <a:tailEnd/>
+              </a:ln>
+            </p:spPr>
+          </p:pic>
+          <p:pic>
+            <p:nvPicPr>
+              <p:cNvPr id="20" name="Picture 19"/>
+              <p:cNvPicPr>
+                <a:picLocks noChangeAspect="1"/>
+              </p:cNvPicPr>
+              <p:nvPr/>
+            </p:nvPicPr>
+            <p:blipFill>
+              <a:blip r:embed="rId9">
+                <a:extLst>
+                  <a:ext uri="{28A0092B-C50C-407E-A947-70E740481C1C}">
+                    <a14:useLocalDpi xmlns:a14="http://schemas.microsoft.com/office/drawing/2010/main" val="0"/>
+                  </a:ext>
+                </a:extLst>
+              </a:blip>
+              <a:stretch>
+                <a:fillRect/>
+              </a:stretch>
+            </p:blipFill>
+            <p:spPr>
+              <a:xfrm>
+                <a:off x="26742825" y="18090567"/>
+                <a:ext cx="3513001" cy="2364321"/>
+              </a:xfrm>
+              <a:prstGeom prst="rect">
+                <a:avLst/>
+              </a:prstGeom>
+            </p:spPr>
+          </p:pic>
+          <p:sp>
+            <p:nvSpPr>
+              <p:cNvPr id="47" name="TextBox 46"/>
+              <p:cNvSpPr txBox="1"/>
+              <p:nvPr/>
+            </p:nvSpPr>
+            <p:spPr>
+              <a:xfrm>
+                <a:off x="26248152" y="21192493"/>
+                <a:ext cx="10890348" cy="830997"/>
+              </a:xfrm>
+              <a:prstGeom prst="rect">
+                <a:avLst/>
+              </a:prstGeom>
+              <a:noFill/>
+            </p:spPr>
+            <p:txBody>
+              <a:bodyPr wrap="square" rtlCol="0">
+                <a:spAutoFit/>
+              </a:bodyPr>
+              <a:lstStyle/>
+              <a:p>
+                <a:r>
+                  <a:rPr lang="en-US" sz="2400" dirty="0" smtClean="0">
+                    <a:latin typeface="Times" panose="02020603050405020304" pitchFamily="18" charset="0"/>
+                    <a:cs typeface="Times" panose="02020603050405020304" pitchFamily="18" charset="0"/>
+                  </a:rPr>
+                  <a:t>Figure </a:t>
+                </a:r>
+                <a:r>
+                  <a:rPr lang="en-US" sz="2400" dirty="0">
+                    <a:latin typeface="Times" panose="02020603050405020304" pitchFamily="18" charset="0"/>
+                    <a:cs typeface="Times" panose="02020603050405020304" pitchFamily="18" charset="0"/>
+                  </a:rPr>
+                  <a:t>1</a:t>
+                </a:r>
+                <a:r>
+                  <a:rPr lang="en-US" sz="2400" dirty="0" smtClean="0">
+                    <a:latin typeface="Times" panose="02020603050405020304" pitchFamily="18" charset="0"/>
+                    <a:cs typeface="Times" panose="02020603050405020304" pitchFamily="18" charset="0"/>
+                  </a:rPr>
+                  <a:t>: </a:t>
+                </a:r>
+                <a:r>
+                  <a:rPr lang="en-US" sz="2400" dirty="0" smtClean="0">
+                    <a:latin typeface="Times" panose="02020603050405020304" pitchFamily="18" charset="0"/>
+                    <a:cs typeface="Times" panose="02020603050405020304" pitchFamily="18" charset="0"/>
+                  </a:rPr>
+                  <a:t>Landscape and aerial views of Lancer Park Pond (LPP). LPP is a </a:t>
+                </a:r>
+                <a:r>
+                  <a:rPr lang="en-US" sz="2400" dirty="0" err="1" smtClean="0">
+                    <a:latin typeface="Times" panose="02020603050405020304" pitchFamily="18" charset="0"/>
+                    <a:cs typeface="Times" panose="02020603050405020304" pitchFamily="18" charset="0"/>
+                  </a:rPr>
+                  <a:t>stormwater</a:t>
+                </a:r>
+                <a:r>
+                  <a:rPr lang="en-US" sz="2400" dirty="0" smtClean="0">
+                    <a:latin typeface="Times" panose="02020603050405020304" pitchFamily="18" charset="0"/>
+                    <a:cs typeface="Times" panose="02020603050405020304" pitchFamily="18" charset="0"/>
+                  </a:rPr>
+                  <a:t> pond with a surface area of 0.06 ha and a maximum depth of 1.5m. </a:t>
+                </a:r>
+                <a:endParaRPr lang="en-US" sz="2400" dirty="0">
+                  <a:latin typeface="Times" panose="02020603050405020304" pitchFamily="18" charset="0"/>
+                  <a:cs typeface="Times" panose="02020603050405020304" pitchFamily="18" charset="0"/>
+                </a:endParaRPr>
+              </a:p>
+            </p:txBody>
+          </p:sp>
+        </p:grpSp>
+      </p:grpSp>
+      <p:pic>
+        <p:nvPicPr>
+          <p:cNvPr id="43" name="Picture 42"/>
+          <p:cNvPicPr>
+            <a:picLocks noChangeAspect="1"/>
+          </p:cNvPicPr>
+          <p:nvPr/>
+        </p:nvPicPr>
+        <p:blipFill>
+          <a:blip r:embed="rId10"/>
+          <a:stretch>
+            <a:fillRect/>
+          </a:stretch>
+        </p:blipFill>
+        <p:spPr>
+          <a:xfrm>
+            <a:off x="28729713" y="7648493"/>
+            <a:ext cx="8760687" cy="8760687"/>
+          </a:xfrm>
+          <a:prstGeom prst="rect">
+            <a:avLst/>
+          </a:prstGeom>
+        </p:spPr>
+      </p:pic>
+      <p:grpSp>
+        <p:nvGrpSpPr>
+          <p:cNvPr id="51" name="Group 50"/>
+          <p:cNvGrpSpPr/>
+          <p:nvPr/>
+        </p:nvGrpSpPr>
+        <p:grpSpPr>
+          <a:xfrm>
+            <a:off x="11079918" y="8851355"/>
+            <a:ext cx="8153848" cy="9996881"/>
+            <a:chOff x="10005674" y="5511185"/>
+            <a:chExt cx="8153848" cy="9996881"/>
+          </a:xfrm>
+        </p:grpSpPr>
         <p:sp>
           <p:nvSpPr>
-            <p:cNvPr id="55" name="TextBox 54"/>
+            <p:cNvPr id="27" name="TextBox 26"/>
             <p:cNvSpPr txBox="1"/>
             <p:nvPr/>
           </p:nvSpPr>
           <p:spPr>
             <a:xfrm>
-              <a:off x="469453" y="19240064"/>
-              <a:ext cx="9348238" cy="979223"/>
+              <a:off x="10187584" y="13199742"/>
+              <a:ext cx="7971938" cy="2308324"/>
             </a:xfrm>
             <a:prstGeom prst="rect">
               <a:avLst/>
@@ -4488,21 +4662,126 @@
                   <a:latin typeface="Times" panose="02020603050405020304" pitchFamily="18" charset="0"/>
                   <a:cs typeface="Times" panose="02020603050405020304" pitchFamily="18" charset="0"/>
                 </a:rPr>
-                <a:t>Figure </a:t>
+                <a:t>A </a:t>
               </a:r>
               <a:r>
                 <a:rPr lang="en-US" sz="2400" dirty="0" smtClean="0">
                   <a:latin typeface="Times" panose="02020603050405020304" pitchFamily="18" charset="0"/>
                   <a:cs typeface="Times" panose="02020603050405020304" pitchFamily="18" charset="0"/>
                 </a:rPr>
-                <a:t>6: </a:t>
+                <a:t>comparison of the </a:t>
               </a:r>
               <a:r>
                 <a:rPr lang="en-US" sz="2400" dirty="0" smtClean="0">
                   <a:latin typeface="Times" panose="02020603050405020304" pitchFamily="18" charset="0"/>
                   <a:cs typeface="Times" panose="02020603050405020304" pitchFamily="18" charset="0"/>
                 </a:rPr>
-                <a:t>A. An example of a BOD bottle with CPOM present. B. An example of a BOD bottle without CPOM.</a:t>
+                <a:t>average sediment </a:t>
+              </a:r>
+              <a:r>
+                <a:rPr lang="en-US" sz="2400" dirty="0" smtClean="0">
+                  <a:latin typeface="Times" panose="02020603050405020304" pitchFamily="18" charset="0"/>
+                  <a:cs typeface="Times" panose="02020603050405020304" pitchFamily="18" charset="0"/>
+                </a:rPr>
+                <a:t>oxygen demand </a:t>
+              </a:r>
+              <a:r>
+                <a:rPr lang="en-US" sz="2400" dirty="0" smtClean="0">
+                  <a:latin typeface="Times" panose="02020603050405020304" pitchFamily="18" charset="0"/>
+                  <a:cs typeface="Times" panose="02020603050405020304" pitchFamily="18" charset="0"/>
+                </a:rPr>
+                <a:t>(SOD) in </a:t>
+              </a:r>
+              <a:r>
+                <a:rPr lang="en-US" sz="2400" dirty="0" smtClean="0">
+                  <a:latin typeface="Times" panose="02020603050405020304" pitchFamily="18" charset="0"/>
+                  <a:cs typeface="Times" panose="02020603050405020304" pitchFamily="18" charset="0"/>
+                </a:rPr>
+                <a:t>BOD bottles with </a:t>
+              </a:r>
+              <a:r>
+                <a:rPr lang="en-US" sz="2400" dirty="0" smtClean="0">
+                  <a:latin typeface="Times" panose="02020603050405020304" pitchFamily="18" charset="0"/>
+                  <a:cs typeface="Times" panose="02020603050405020304" pitchFamily="18" charset="0"/>
+                </a:rPr>
+                <a:t> and without leaf litter. Leaf litter </a:t>
+              </a:r>
+              <a:r>
+                <a:rPr lang="en-US" sz="2400" dirty="0" smtClean="0">
+                  <a:latin typeface="Times" panose="02020603050405020304" pitchFamily="18" charset="0"/>
+                  <a:cs typeface="Times" panose="02020603050405020304" pitchFamily="18" charset="0"/>
+                </a:rPr>
+                <a:t>significantly </a:t>
+              </a:r>
+              <a:r>
+                <a:rPr lang="en-US" sz="2400" dirty="0" smtClean="0">
+                  <a:latin typeface="Times" panose="02020603050405020304" pitchFamily="18" charset="0"/>
+                  <a:cs typeface="Times" panose="02020603050405020304" pitchFamily="18" charset="0"/>
+                </a:rPr>
+                <a:t>increases </a:t>
+              </a:r>
+              <a:r>
+                <a:rPr lang="en-US" sz="2400" dirty="0" smtClean="0">
+                  <a:latin typeface="Times" panose="02020603050405020304" pitchFamily="18" charset="0"/>
+                  <a:cs typeface="Times" panose="02020603050405020304" pitchFamily="18" charset="0"/>
+                </a:rPr>
+                <a:t>sediment oxygen demand </a:t>
+              </a:r>
+              <a:r>
+                <a:rPr lang="en-US" sz="2400" dirty="0" smtClean="0">
+                  <a:latin typeface="Times" panose="02020603050405020304" pitchFamily="18" charset="0"/>
+                  <a:cs typeface="Times" panose="02020603050405020304" pitchFamily="18" charset="0"/>
+                </a:rPr>
+                <a:t>in </a:t>
+              </a:r>
+              <a:r>
+                <a:rPr lang="en-US" sz="2400" dirty="0" smtClean="0">
+                  <a:latin typeface="Times" panose="02020603050405020304" pitchFamily="18" charset="0"/>
+                  <a:cs typeface="Times" panose="02020603050405020304" pitchFamily="18" charset="0"/>
+                </a:rPr>
+                <a:t>a </a:t>
+              </a:r>
+              <a:r>
+                <a:rPr lang="en-US" sz="2400" dirty="0" smtClean="0">
+                  <a:latin typeface="Times" panose="02020603050405020304" pitchFamily="18" charset="0"/>
+                  <a:cs typeface="Times" panose="02020603050405020304" pitchFamily="18" charset="0"/>
+                </a:rPr>
+                <a:t>the pond sediments. Note that, </a:t>
+              </a:r>
+              <a:r>
+                <a:rPr lang="en-US" sz="2400" dirty="0" smtClean="0">
+                  <a:latin typeface="Times" panose="02020603050405020304" pitchFamily="18" charset="0"/>
+                  <a:cs typeface="Times" panose="02020603050405020304" pitchFamily="18" charset="0"/>
+                </a:rPr>
+                <a:t>since these results were </a:t>
+              </a:r>
+              <a:r>
+                <a:rPr lang="en-US" sz="2400" dirty="0" smtClean="0">
+                  <a:latin typeface="Times" panose="02020603050405020304" pitchFamily="18" charset="0"/>
+                  <a:cs typeface="Times" panose="02020603050405020304" pitchFamily="18" charset="0"/>
+                </a:rPr>
+                <a:t>normalized by </a:t>
+              </a:r>
+              <a:r>
+                <a:rPr lang="en-US" sz="2400" dirty="0" smtClean="0">
+                  <a:latin typeface="Times" panose="02020603050405020304" pitchFamily="18" charset="0"/>
+                  <a:cs typeface="Times" panose="02020603050405020304" pitchFamily="18" charset="0"/>
+                </a:rPr>
+                <a:t>their organic matter content, </a:t>
+              </a:r>
+              <a:r>
+                <a:rPr lang="en-US" sz="2400" dirty="0" smtClean="0">
+                  <a:latin typeface="Times" panose="02020603050405020304" pitchFamily="18" charset="0"/>
+                  <a:cs typeface="Times" panose="02020603050405020304" pitchFamily="18" charset="0"/>
+                </a:rPr>
+                <a:t>the effect </a:t>
+              </a:r>
+              <a:r>
+                <a:rPr lang="en-US" sz="2400" dirty="0" smtClean="0">
+                  <a:latin typeface="Times" panose="02020603050405020304" pitchFamily="18" charset="0"/>
+                  <a:cs typeface="Times" panose="02020603050405020304" pitchFamily="18" charset="0"/>
+                </a:rPr>
+                <a:t>is not due to the increase in organic matter with the leaf additions.</a:t>
               </a:r>
               <a:endParaRPr lang="en-US" sz="2400" dirty="0">
                 <a:latin typeface="Times" panose="02020603050405020304" pitchFamily="18" charset="0"/>
@@ -4511,16 +4790,55 @@
             </a:p>
           </p:txBody>
         </p:sp>
+        <p:pic>
+          <p:nvPicPr>
+            <p:cNvPr id="44" name="Picture 43"/>
+            <p:cNvPicPr>
+              <a:picLocks noChangeAspect="1"/>
+            </p:cNvPicPr>
+            <p:nvPr/>
+          </p:nvPicPr>
+          <p:blipFill>
+            <a:blip r:embed="rId11"/>
+            <a:stretch>
+              <a:fillRect/>
+            </a:stretch>
+          </p:blipFill>
+          <p:spPr>
+            <a:xfrm>
+              <a:off x="10005674" y="5511185"/>
+              <a:ext cx="7688557" cy="7688557"/>
+            </a:xfrm>
+            <a:prstGeom prst="rect">
+              <a:avLst/>
+            </a:prstGeom>
+          </p:spPr>
+        </p:pic>
+      </p:grpSp>
+      <p:grpSp>
+        <p:nvGrpSpPr>
+          <p:cNvPr id="52" name="Group 51"/>
+          <p:cNvGrpSpPr/>
+          <p:nvPr/>
+        </p:nvGrpSpPr>
+        <p:grpSpPr>
+          <a:xfrm>
+            <a:off x="20430463" y="8669915"/>
+            <a:ext cx="8043116" cy="10159285"/>
+            <a:chOff x="9962629" y="17775644"/>
+            <a:chExt cx="8043116" cy="10159285"/>
+          </a:xfrm>
+        </p:grpSpPr>
         <p:sp>
           <p:nvSpPr>
-            <p:cNvPr id="56" name="TextBox 55"/>
+            <p:cNvPr id="32" name="TextBox 31"/>
             <p:cNvSpPr txBox="1"/>
             <p:nvPr/>
           </p:nvSpPr>
           <p:spPr>
             <a:xfrm>
-              <a:off x="3233695" y="18173954"/>
-              <a:ext cx="622491" cy="471478"/>
+              <a:off x="10022308" y="25626605"/>
+              <a:ext cx="7983437" cy="2308324"/>
             </a:xfrm>
             <a:prstGeom prst="rect">
               <a:avLst/>
@@ -4534,23 +4852,110 @@
             <a:lstStyle/>
             <a:p>
               <a:r>
-                <a:rPr lang="en-US" sz="2000" dirty="0" smtClean="0"/>
-                <a:t>6A</a:t>
-              </a:r>
-              <a:endParaRPr lang="en-US" sz="2000" dirty="0"/>
+                <a:rPr lang="en-US" sz="2400" dirty="0" smtClean="0">
+                  <a:latin typeface="Times" panose="02020603050405020304" pitchFamily="18" charset="0"/>
+                  <a:cs typeface="Times" panose="02020603050405020304" pitchFamily="18" charset="0"/>
+                </a:rPr>
+                <a:t>A </a:t>
+              </a:r>
+              <a:r>
+                <a:rPr lang="en-US" sz="2400" dirty="0">
+                  <a:latin typeface="Times" panose="02020603050405020304" pitchFamily="18" charset="0"/>
+                  <a:cs typeface="Times" panose="02020603050405020304" pitchFamily="18" charset="0"/>
+                </a:rPr>
+                <a:t>comparison of the </a:t>
+              </a:r>
+              <a:r>
+                <a:rPr lang="en-US" sz="2400" dirty="0" smtClean="0">
+                  <a:latin typeface="Times" panose="02020603050405020304" pitchFamily="18" charset="0"/>
+                  <a:cs typeface="Times" panose="02020603050405020304" pitchFamily="18" charset="0"/>
+                </a:rPr>
+                <a:t>average sediment </a:t>
+              </a:r>
+              <a:r>
+                <a:rPr lang="en-US" sz="2400" dirty="0">
+                  <a:latin typeface="Times" panose="02020603050405020304" pitchFamily="18" charset="0"/>
+                  <a:cs typeface="Times" panose="02020603050405020304" pitchFamily="18" charset="0"/>
+                </a:rPr>
+                <a:t>oxygen demand (SOD) in BOD bottles with  and without </a:t>
+              </a:r>
+              <a:r>
+                <a:rPr lang="en-US" sz="2400" dirty="0" smtClean="0">
+                  <a:latin typeface="Times" panose="02020603050405020304" pitchFamily="18" charset="0"/>
+                  <a:cs typeface="Times" panose="02020603050405020304" pitchFamily="18" charset="0"/>
+                </a:rPr>
+                <a:t>nutrient enrichment. Added nutrients significantly </a:t>
+              </a:r>
+              <a:r>
+                <a:rPr lang="en-US" sz="2400" dirty="0">
+                  <a:latin typeface="Times" panose="02020603050405020304" pitchFamily="18" charset="0"/>
+                  <a:cs typeface="Times" panose="02020603050405020304" pitchFamily="18" charset="0"/>
+                </a:rPr>
+                <a:t>increases sediment oxygen demand in a the pond sediments. </a:t>
+              </a:r>
+              <a:r>
+                <a:rPr lang="en-US" sz="2400" dirty="0" smtClean="0">
+                  <a:latin typeface="Times" panose="02020603050405020304" pitchFamily="18" charset="0"/>
+                  <a:cs typeface="Times" panose="02020603050405020304" pitchFamily="18" charset="0"/>
+                </a:rPr>
+                <a:t>There was no significant interaction between leaf litter and nutrients, so the effect of nutrients was independent of the presence of leaf litter.</a:t>
+              </a:r>
+              <a:endParaRPr lang="en-US" sz="2400" dirty="0">
+                <a:latin typeface="Times" panose="02020603050405020304" pitchFamily="18" charset="0"/>
+                <a:cs typeface="Times" panose="02020603050405020304" pitchFamily="18" charset="0"/>
+              </a:endParaRPr>
             </a:p>
           </p:txBody>
         </p:sp>
+        <p:pic>
+          <p:nvPicPr>
+            <p:cNvPr id="45" name="Picture 44"/>
+            <p:cNvPicPr>
+              <a:picLocks noChangeAspect="1"/>
+            </p:cNvPicPr>
+            <p:nvPr/>
+          </p:nvPicPr>
+          <p:blipFill>
+            <a:blip r:embed="rId12"/>
+            <a:stretch>
+              <a:fillRect/>
+            </a:stretch>
+          </p:blipFill>
+          <p:spPr>
+            <a:xfrm>
+              <a:off x="9962629" y="17775644"/>
+              <a:ext cx="7731602" cy="7731602"/>
+            </a:xfrm>
+            <a:prstGeom prst="rect">
+              <a:avLst/>
+            </a:prstGeom>
+          </p:spPr>
+        </p:pic>
+      </p:grpSp>
+      <p:grpSp>
+        <p:nvGrpSpPr>
+          <p:cNvPr id="53" name="Group 52"/>
+          <p:cNvGrpSpPr/>
+          <p:nvPr/>
+        </p:nvGrpSpPr>
+        <p:grpSpPr>
+          <a:xfrm>
+            <a:off x="11079917" y="18050164"/>
+            <a:ext cx="8153848" cy="10587659"/>
+            <a:chOff x="18177764" y="4551075"/>
+            <a:chExt cx="8692609" cy="10587659"/>
+          </a:xfrm>
+        </p:grpSpPr>
         <p:sp>
           <p:nvSpPr>
-            <p:cNvPr id="73" name="TextBox 72"/>
+            <p:cNvPr id="31" name="TextBox 30"/>
             <p:cNvSpPr txBox="1"/>
             <p:nvPr/>
           </p:nvSpPr>
           <p:spPr>
             <a:xfrm>
-              <a:off x="8078813" y="18173954"/>
-              <a:ext cx="511518" cy="471478"/>
+              <a:off x="18371694" y="13199742"/>
+              <a:ext cx="8498679" cy="1938992"/>
             </a:xfrm>
             <a:prstGeom prst="rect">
               <a:avLst/>
@@ -4564,28 +4969,256 @@
             <a:lstStyle/>
             <a:p>
               <a:r>
-                <a:rPr lang="en-US" sz="2000" dirty="0" smtClean="0"/>
-                <a:t>6B</a:t>
-              </a:r>
-              <a:endParaRPr lang="en-US" sz="2000" dirty="0"/>
+                <a:rPr lang="en-US" sz="2400" dirty="0" smtClean="0">
+                  <a:latin typeface="Times" panose="02020603050405020304" pitchFamily="18" charset="0"/>
+                  <a:cs typeface="Times" panose="02020603050405020304" pitchFamily="18" charset="0"/>
+                </a:rPr>
+                <a:t>A </a:t>
+              </a:r>
+              <a:r>
+                <a:rPr lang="en-US" sz="2400" dirty="0" smtClean="0">
+                  <a:latin typeface="Times" panose="02020603050405020304" pitchFamily="18" charset="0"/>
+                  <a:cs typeface="Times" panose="02020603050405020304" pitchFamily="18" charset="0"/>
+                </a:rPr>
+                <a:t>comparison of the </a:t>
+              </a:r>
+              <a:r>
+                <a:rPr lang="en-US" sz="2400" dirty="0" smtClean="0">
+                  <a:latin typeface="Times" panose="02020603050405020304" pitchFamily="18" charset="0"/>
+                  <a:cs typeface="Times" panose="02020603050405020304" pitchFamily="18" charset="0"/>
+                </a:rPr>
+                <a:t>effect of leaf litter on sediment </a:t>
+              </a:r>
+              <a:r>
+                <a:rPr lang="en-US" sz="2400" dirty="0" smtClean="0">
+                  <a:latin typeface="Times" panose="02020603050405020304" pitchFamily="18" charset="0"/>
+                  <a:cs typeface="Times" panose="02020603050405020304" pitchFamily="18" charset="0"/>
+                </a:rPr>
+                <a:t>oxygen demand </a:t>
+              </a:r>
+              <a:r>
+                <a:rPr lang="en-US" sz="2400" dirty="0" smtClean="0">
+                  <a:latin typeface="Times" panose="02020603050405020304" pitchFamily="18" charset="0"/>
+                  <a:cs typeface="Times" panose="02020603050405020304" pitchFamily="18" charset="0"/>
+                </a:rPr>
+                <a:t>(SOD) in </a:t>
+              </a:r>
+              <a:r>
+                <a:rPr lang="en-US" sz="2400" dirty="0" smtClean="0">
+                  <a:latin typeface="Times" panose="02020603050405020304" pitchFamily="18" charset="0"/>
+                  <a:cs typeface="Times" panose="02020603050405020304" pitchFamily="18" charset="0"/>
+                </a:rPr>
+                <a:t>bottles </a:t>
+              </a:r>
+              <a:r>
+                <a:rPr lang="en-US" sz="2400" dirty="0" smtClean="0">
+                  <a:latin typeface="Times" panose="02020603050405020304" pitchFamily="18" charset="0"/>
+                  <a:cs typeface="Times" panose="02020603050405020304" pitchFamily="18" charset="0"/>
+                </a:rPr>
+                <a:t>over time.  The SOD and the effect of leaf litter on SOD was greatest after 2 and 7 days of incubation and declined during the experiment. There was no significant effect of leaf litter </a:t>
+              </a:r>
+              <a:r>
+                <a:rPr lang="en-US" sz="2400" dirty="0" smtClean="0">
+                  <a:latin typeface="Times" panose="02020603050405020304" pitchFamily="18" charset="0"/>
+                  <a:cs typeface="Times" panose="02020603050405020304" pitchFamily="18" charset="0"/>
+                </a:rPr>
+                <a:t>on SOD</a:t>
+              </a:r>
+              <a:r>
+                <a:rPr lang="en-US" sz="2400" dirty="0" smtClean="0">
+                  <a:latin typeface="Times" panose="02020603050405020304" pitchFamily="18" charset="0"/>
+                  <a:cs typeface="Times" panose="02020603050405020304" pitchFamily="18" charset="0"/>
+                </a:rPr>
+                <a:t> after </a:t>
+              </a:r>
+              <a:r>
+                <a:rPr lang="en-US" sz="2400" dirty="0" smtClean="0">
+                  <a:latin typeface="Times" panose="02020603050405020304" pitchFamily="18" charset="0"/>
+                  <a:cs typeface="Times" panose="02020603050405020304" pitchFamily="18" charset="0"/>
+                </a:rPr>
+                <a:t>21 days. </a:t>
+              </a:r>
+              <a:endParaRPr lang="en-US" sz="2400" dirty="0">
+                <a:latin typeface="Times" panose="02020603050405020304" pitchFamily="18" charset="0"/>
+                <a:cs typeface="Times" panose="02020603050405020304" pitchFamily="18" charset="0"/>
+              </a:endParaRPr>
             </a:p>
           </p:txBody>
         </p:sp>
+        <p:pic>
+          <p:nvPicPr>
+            <p:cNvPr id="48" name="Picture 47"/>
+            <p:cNvPicPr>
+              <a:picLocks noChangeAspect="1"/>
+            </p:cNvPicPr>
+            <p:nvPr/>
+          </p:nvPicPr>
+          <p:blipFill>
+            <a:blip r:embed="rId13"/>
+            <a:stretch>
+              <a:fillRect/>
+            </a:stretch>
+          </p:blipFill>
+          <p:spPr>
+            <a:xfrm>
+              <a:off x="18177764" y="4551075"/>
+              <a:ext cx="8692608" cy="8692608"/>
+            </a:xfrm>
+            <a:prstGeom prst="rect">
+              <a:avLst/>
+            </a:prstGeom>
+          </p:spPr>
+        </p:pic>
       </p:grpSp>
-      <p:sp>
-        <p:nvSpPr>
-          <p:cNvPr id="2" name="Rectangle 1"/>
+      <p:grpSp>
+        <p:nvGrpSpPr>
+          <p:cNvPr id="54" name="Group 53"/>
+          <p:cNvGrpSpPr/>
+          <p:nvPr/>
+        </p:nvGrpSpPr>
+        <p:grpSpPr>
+          <a:xfrm>
+            <a:off x="20205673" y="17844776"/>
+            <a:ext cx="8970115" cy="10793047"/>
+            <a:chOff x="17694231" y="16707254"/>
+            <a:chExt cx="8970115" cy="10793047"/>
+          </a:xfrm>
+        </p:grpSpPr>
+        <p:sp>
+          <p:nvSpPr>
+            <p:cNvPr id="35" name="TextBox 34"/>
+            <p:cNvSpPr txBox="1"/>
+            <p:nvPr/>
+          </p:nvSpPr>
+          <p:spPr>
+            <a:xfrm>
+              <a:off x="18745199" y="25561309"/>
+              <a:ext cx="7816319" cy="1938992"/>
+            </a:xfrm>
+            <a:prstGeom prst="rect">
+              <a:avLst/>
+            </a:prstGeom>
+            <a:noFill/>
+          </p:spPr>
+          <p:txBody>
+            <a:bodyPr wrap="square" rtlCol="0">
+              <a:spAutoFit/>
+            </a:bodyPr>
+            <a:lstStyle/>
+            <a:p>
+              <a:r>
+                <a:rPr lang="en-US" sz="2400" dirty="0">
+                  <a:latin typeface="Times" panose="02020603050405020304" pitchFamily="18" charset="0"/>
+                  <a:cs typeface="Times" panose="02020603050405020304" pitchFamily="18" charset="0"/>
+                </a:rPr>
+                <a:t>A comparison of the effect of </a:t>
+              </a:r>
+              <a:r>
+                <a:rPr lang="en-US" sz="2400" dirty="0" smtClean="0">
+                  <a:latin typeface="Times" panose="02020603050405020304" pitchFamily="18" charset="0"/>
+                  <a:cs typeface="Times" panose="02020603050405020304" pitchFamily="18" charset="0"/>
+                </a:rPr>
+                <a:t>added nutrients on </a:t>
+              </a:r>
+              <a:r>
+                <a:rPr lang="en-US" sz="2400" dirty="0">
+                  <a:latin typeface="Times" panose="02020603050405020304" pitchFamily="18" charset="0"/>
+                  <a:cs typeface="Times" panose="02020603050405020304" pitchFamily="18" charset="0"/>
+                </a:rPr>
+                <a:t>sediment oxygen demand (SOD) in bottles over time.  The SOD and the </a:t>
+              </a:r>
+              <a:r>
+                <a:rPr lang="en-US" sz="2400" dirty="0" smtClean="0">
+                  <a:latin typeface="Times" panose="02020603050405020304" pitchFamily="18" charset="0"/>
+                  <a:cs typeface="Times" panose="02020603050405020304" pitchFamily="18" charset="0"/>
+                </a:rPr>
+                <a:t>was </a:t>
+              </a:r>
+              <a:r>
+                <a:rPr lang="en-US" sz="2400" dirty="0">
+                  <a:latin typeface="Times" panose="02020603050405020304" pitchFamily="18" charset="0"/>
+                  <a:cs typeface="Times" panose="02020603050405020304" pitchFamily="18" charset="0"/>
+                </a:rPr>
+                <a:t>greatest after 2 and 7 days of incubation </a:t>
+              </a:r>
+              <a:r>
+                <a:rPr lang="en-US" sz="2400" dirty="0" smtClean="0">
+                  <a:latin typeface="Times" panose="02020603050405020304" pitchFamily="18" charset="0"/>
+                  <a:cs typeface="Times" panose="02020603050405020304" pitchFamily="18" charset="0"/>
+                </a:rPr>
+                <a:t>and declined </a:t>
+              </a:r>
+              <a:r>
+                <a:rPr lang="en-US" sz="2400" dirty="0">
+                  <a:latin typeface="Times" panose="02020603050405020304" pitchFamily="18" charset="0"/>
+                  <a:cs typeface="Times" panose="02020603050405020304" pitchFamily="18" charset="0"/>
+                </a:rPr>
+                <a:t>during the </a:t>
+              </a:r>
+              <a:r>
+                <a:rPr lang="en-US" sz="2400" dirty="0" smtClean="0">
+                  <a:latin typeface="Times" panose="02020603050405020304" pitchFamily="18" charset="0"/>
+                  <a:cs typeface="Times" panose="02020603050405020304" pitchFamily="18" charset="0"/>
+                </a:rPr>
+                <a:t>experiment but the effect of nutrients remains consistent for the 21 days of incubation</a:t>
+              </a:r>
+              <a:r>
+                <a:rPr lang="en-US" sz="2400" dirty="0" smtClean="0">
+                  <a:latin typeface="Times" panose="02020603050405020304" pitchFamily="18" charset="0"/>
+                  <a:cs typeface="Times" panose="02020603050405020304" pitchFamily="18" charset="0"/>
+                </a:rPr>
+                <a:t>. </a:t>
+              </a:r>
+              <a:endParaRPr lang="en-US" sz="2400" dirty="0">
+                <a:latin typeface="Times" panose="02020603050405020304" pitchFamily="18" charset="0"/>
+                <a:cs typeface="Times" panose="02020603050405020304" pitchFamily="18" charset="0"/>
+              </a:endParaRPr>
+            </a:p>
+          </p:txBody>
+        </p:sp>
+        <p:pic>
+          <p:nvPicPr>
+            <p:cNvPr id="50" name="Picture 49"/>
+            <p:cNvPicPr>
+              <a:picLocks noChangeAspect="1"/>
+            </p:cNvPicPr>
+            <p:nvPr/>
+          </p:nvPicPr>
+          <p:blipFill>
+            <a:blip r:embed="rId14"/>
+            <a:stretch>
+              <a:fillRect/>
+            </a:stretch>
+          </p:blipFill>
+          <p:spPr>
+            <a:xfrm>
+              <a:off x="17694231" y="16707254"/>
+              <a:ext cx="8970115" cy="8970115"/>
+            </a:xfrm>
+            <a:prstGeom prst="rect">
+              <a:avLst/>
+            </a:prstGeom>
+          </p:spPr>
+        </p:pic>
+      </p:grpSp>
+      <p:sp>
+        <p:nvSpPr>
+          <p:cNvPr id="59" name="Rectangle 58"/>
           <p:cNvSpPr/>
           <p:nvPr/>
         </p:nvSpPr>
         <p:spPr>
           <a:xfrm>
-            <a:off x="846134" y="5554646"/>
-            <a:ext cx="8229600" cy="1371600"/>
+            <a:off x="29360508" y="19788977"/>
+            <a:ext cx="7066402" cy="977350"/>
           </a:xfrm>
           <a:prstGeom prst="rect">
             <a:avLst/>
           </a:prstGeom>
+          <a:solidFill>
+            <a:schemeClr val="tx2"/>
+          </a:solidFill>
+          <a:effectLst/>
         </p:spPr>
         <p:style>
           <a:lnRef idx="1">
@@ -4607,27 +5240,485 @@
           <a:p>
             <a:pPr algn="ctr"/>
             <a:r>
-              <a:rPr lang="en-US" dirty="0" smtClean="0"/>
-              <a:t>Abstract</a:t>
-            </a:r>
-            <a:endParaRPr lang="en-US" dirty="0"/>
-          </a:p>
-        </p:txBody>
-      </p:sp>
-      <p:sp>
-        <p:nvSpPr>
-          <p:cNvPr id="4" name="Rectangle 3"/>
+              <a:rPr lang="en-US" sz="5400" dirty="0" smtClean="0"/>
+              <a:t>Conclusions</a:t>
+            </a:r>
+            <a:endParaRPr lang="en-US" sz="5400" dirty="0"/>
+          </a:p>
+        </p:txBody>
+      </p:sp>
+      <p:grpSp>
+        <p:nvGrpSpPr>
+          <p:cNvPr id="65" name="Group 64"/>
+          <p:cNvGrpSpPr/>
+          <p:nvPr/>
+        </p:nvGrpSpPr>
+        <p:grpSpPr>
+          <a:xfrm>
+            <a:off x="577489" y="29759501"/>
+            <a:ext cx="8766891" cy="6729609"/>
+            <a:chOff x="11224346" y="5769877"/>
+            <a:chExt cx="7921137" cy="6049175"/>
+          </a:xfrm>
+        </p:grpSpPr>
+        <p:sp>
+          <p:nvSpPr>
+            <p:cNvPr id="63" name="TextBox 62"/>
+            <p:cNvSpPr txBox="1"/>
+            <p:nvPr/>
+          </p:nvSpPr>
+          <p:spPr>
+            <a:xfrm>
+              <a:off x="11224346" y="7294736"/>
+              <a:ext cx="7921137" cy="4524316"/>
+            </a:xfrm>
+            <a:prstGeom prst="rect">
+              <a:avLst/>
+            </a:prstGeom>
+            <a:noFill/>
+          </p:spPr>
+          <p:txBody>
+            <a:bodyPr wrap="square" rtlCol="0">
+              <a:spAutoFit/>
+            </a:bodyPr>
+            <a:lstStyle/>
+            <a:p>
+              <a:pPr marL="272434" indent="-272434" algn="just">
+                <a:buFont typeface="Arial"/>
+                <a:buChar char="•"/>
+              </a:pPr>
+              <a:r>
+                <a:rPr lang="en-US" sz="1800" dirty="0" smtClean="0">
+                  <a:latin typeface="Times"/>
+                  <a:cs typeface="Times"/>
+                </a:rPr>
+                <a:t>The </a:t>
+              </a:r>
+              <a:r>
+                <a:rPr lang="en-US" sz="1800" dirty="0" smtClean="0">
+                  <a:latin typeface="Times"/>
+                  <a:cs typeface="Times"/>
+                </a:rPr>
+                <a:t>combined effect of leaf litter and nutrient enrichment on sediment processes was tested with a complete factorial design</a:t>
+              </a:r>
+              <a:r>
+                <a:rPr lang="en-US" sz="1800" dirty="0" smtClean="0">
+                  <a:latin typeface="Times"/>
+                  <a:cs typeface="Times"/>
+                </a:rPr>
+                <a:t> design.</a:t>
+              </a:r>
+              <a:endParaRPr lang="en-US" sz="1800" dirty="0" smtClean="0">
+                <a:latin typeface="Times"/>
+                <a:cs typeface="Times"/>
+              </a:endParaRPr>
+            </a:p>
+            <a:p>
+              <a:pPr marL="272434" indent="-272434" algn="just">
+                <a:buFont typeface="Arial"/>
+                <a:buChar char="•"/>
+              </a:pPr>
+              <a:r>
+                <a:rPr lang="en-US" sz="1800" dirty="0" smtClean="0">
+                  <a:latin typeface="Times"/>
+                  <a:cs typeface="Times"/>
+                </a:rPr>
+                <a:t>Each BOD bottle received 100 ml of sediment collected from </a:t>
+              </a:r>
+              <a:r>
+                <a:rPr lang="en-US" sz="1800" dirty="0" smtClean="0">
+                  <a:latin typeface="Times"/>
+                  <a:cs typeface="Times"/>
+                </a:rPr>
+                <a:t>Lancer Park Pond </a:t>
+              </a:r>
+              <a:r>
+                <a:rPr lang="en-US" sz="1800" dirty="0" smtClean="0">
+                  <a:latin typeface="Times"/>
+                  <a:cs typeface="Times"/>
+                </a:rPr>
+                <a:t>(Fig. 1) on </a:t>
+              </a:r>
+              <a:r>
+                <a:rPr lang="en-US" sz="1800" dirty="0" smtClean="0">
+                  <a:latin typeface="Times"/>
+                  <a:cs typeface="Times"/>
+                </a:rPr>
+                <a:t>29 </a:t>
+              </a:r>
+              <a:r>
+                <a:rPr lang="en-US" sz="1800" dirty="0">
+                  <a:latin typeface="Times"/>
+                  <a:cs typeface="Times"/>
+                </a:rPr>
+                <a:t>May, 2014 using </a:t>
+              </a:r>
+              <a:r>
+                <a:rPr lang="en-US" sz="1800" dirty="0" smtClean="0">
+                  <a:latin typeface="Times"/>
+                  <a:cs typeface="Times"/>
+                </a:rPr>
+                <a:t>an </a:t>
+              </a:r>
+              <a:r>
+                <a:rPr lang="en-US" sz="1800" dirty="0" err="1">
+                  <a:latin typeface="Times"/>
+                  <a:cs typeface="Times"/>
+                </a:rPr>
+                <a:t>E</a:t>
+              </a:r>
+              <a:r>
+                <a:rPr lang="en-US" sz="1800" dirty="0" err="1" smtClean="0">
+                  <a:latin typeface="Times"/>
+                  <a:cs typeface="Times"/>
+                </a:rPr>
+                <a:t>ckman</a:t>
+              </a:r>
+              <a:r>
+                <a:rPr lang="en-US" sz="1800" dirty="0" smtClean="0">
+                  <a:latin typeface="Times"/>
+                  <a:cs typeface="Times"/>
+                </a:rPr>
+                <a:t>-</a:t>
+              </a:r>
+              <a:r>
+                <a:rPr lang="en-US" sz="1800" dirty="0" smtClean="0">
+                  <a:latin typeface="Times"/>
+                  <a:cs typeface="Times"/>
+                </a:rPr>
+                <a:t>dredge and sieved through 250 </a:t>
+              </a:r>
+              <a:r>
+                <a:rPr lang="en-US" sz="1800" dirty="0" err="1" smtClean="0">
+                  <a:latin typeface="Times"/>
+                  <a:cs typeface="Times"/>
+                </a:rPr>
+                <a:t>μm</a:t>
+              </a:r>
+              <a:r>
+                <a:rPr lang="en-US" sz="1800" dirty="0" smtClean="0">
+                  <a:latin typeface="Times"/>
+                  <a:cs typeface="Times"/>
+                </a:rPr>
+                <a:t> mes</a:t>
+              </a:r>
+              <a:r>
+                <a:rPr lang="en-US" sz="1800" dirty="0" smtClean="0">
+                  <a:latin typeface="Times"/>
+                  <a:cs typeface="Times"/>
+                </a:rPr>
+                <a:t>h.</a:t>
+              </a:r>
+              <a:endParaRPr lang="en-US" sz="1800" dirty="0" smtClean="0">
+                <a:latin typeface="Times"/>
+                <a:cs typeface="Times"/>
+              </a:endParaRPr>
+            </a:p>
+            <a:p>
+              <a:pPr marL="272434" indent="-272434" algn="just">
+                <a:buFont typeface="Arial"/>
+                <a:buChar char="•"/>
+              </a:pPr>
+              <a:r>
+                <a:rPr lang="en-US" sz="1800" dirty="0" smtClean="0">
+                  <a:latin typeface="Times"/>
+                  <a:cs typeface="Times"/>
+                </a:rPr>
+                <a:t>The BOD bottles were then filled with Lancer Park Pond water </a:t>
+              </a:r>
+              <a:r>
+                <a:rPr lang="en-US" sz="1800" dirty="0" smtClean="0">
+                  <a:latin typeface="Times"/>
+                  <a:cs typeface="Times"/>
+                </a:rPr>
+                <a:t>collected </a:t>
+              </a:r>
+              <a:r>
+                <a:rPr lang="en-US" sz="1800" dirty="0" smtClean="0">
+                  <a:latin typeface="Times"/>
+                  <a:cs typeface="Times"/>
+                </a:rPr>
+                <a:t>9 June 2014 </a:t>
+              </a:r>
+              <a:r>
+                <a:rPr lang="en-US" sz="1800" dirty="0" smtClean="0">
+                  <a:latin typeface="Times"/>
+                  <a:cs typeface="Times"/>
+                </a:rPr>
+                <a:t>from 0.5 m.</a:t>
+              </a:r>
+            </a:p>
+            <a:p>
+              <a:pPr marL="272434" indent="-272434" algn="just">
+                <a:buFont typeface="Arial"/>
+                <a:buChar char="•"/>
+              </a:pPr>
+              <a:r>
+                <a:rPr lang="en-US" sz="1800" dirty="0" smtClean="0">
+                  <a:latin typeface="Times"/>
+                  <a:cs typeface="Times"/>
+                </a:rPr>
+                <a:t>Nutrient </a:t>
+              </a:r>
+              <a:r>
+                <a:rPr lang="en-US" sz="1800" dirty="0" smtClean="0">
+                  <a:latin typeface="Times"/>
+                  <a:cs typeface="Times"/>
+                </a:rPr>
+                <a:t>enrichment treatments were created by adding 300 </a:t>
+              </a:r>
+              <a:r>
+                <a:rPr lang="en-US" sz="1800" dirty="0" smtClean="0">
+                  <a:latin typeface="Times"/>
+                  <a:cs typeface="Times"/>
+                </a:rPr>
+                <a:t>μg L</a:t>
+              </a:r>
+              <a:r>
+                <a:rPr lang="en-US" sz="1800" baseline="30000" dirty="0" smtClean="0">
+                  <a:latin typeface="Times"/>
+                  <a:cs typeface="Times"/>
+                </a:rPr>
+                <a:t>-1</a:t>
+              </a:r>
+              <a:r>
+                <a:rPr lang="en-US" sz="1800" dirty="0" smtClean="0">
+                  <a:latin typeface="Times"/>
+                  <a:cs typeface="Times"/>
+                </a:rPr>
+                <a:t> </a:t>
+              </a:r>
+              <a:r>
+                <a:rPr lang="en-US" sz="1800" dirty="0" smtClean="0">
+                  <a:latin typeface="Times"/>
+                  <a:cs typeface="Times"/>
+                </a:rPr>
+                <a:t>of DIN and 30 </a:t>
+              </a:r>
+              <a:r>
+                <a:rPr lang="en-US" sz="1800" dirty="0">
+                  <a:latin typeface="Times"/>
+                  <a:cs typeface="Times"/>
+                </a:rPr>
+                <a:t>μg L</a:t>
+              </a:r>
+              <a:r>
+                <a:rPr lang="en-US" sz="1800" baseline="30000" dirty="0">
+                  <a:latin typeface="Times"/>
+                  <a:cs typeface="Times"/>
+                </a:rPr>
+                <a:t>-1</a:t>
+              </a:r>
+              <a:r>
+                <a:rPr lang="en-US" sz="1800" dirty="0">
+                  <a:latin typeface="Times"/>
+                  <a:cs typeface="Times"/>
+                </a:rPr>
+                <a:t> of </a:t>
+              </a:r>
+              <a:r>
+                <a:rPr lang="en-US" sz="1800" dirty="0" smtClean="0">
+                  <a:latin typeface="Times"/>
+                  <a:cs typeface="Times"/>
+                </a:rPr>
+                <a:t>DIP to the </a:t>
+              </a:r>
+              <a:r>
+                <a:rPr lang="en-US" sz="1800" dirty="0" smtClean="0">
+                  <a:latin typeface="Times"/>
+                  <a:cs typeface="Times"/>
+                </a:rPr>
+                <a:t>overlying</a:t>
+              </a:r>
+              <a:r>
+                <a:rPr lang="en-US" sz="1800" dirty="0" smtClean="0">
+                  <a:latin typeface="Times"/>
+                  <a:cs typeface="Times"/>
+                </a:rPr>
+                <a:t> water.</a:t>
+              </a:r>
+              <a:endParaRPr lang="en-US" sz="1800" dirty="0" smtClean="0">
+                <a:latin typeface="Times"/>
+                <a:cs typeface="Times"/>
+              </a:endParaRPr>
+            </a:p>
+            <a:p>
+              <a:pPr marL="272434" indent="-272434" algn="just">
+                <a:buFont typeface="Arial"/>
+                <a:buChar char="•"/>
+              </a:pPr>
+              <a:r>
+                <a:rPr lang="en-US" sz="1800" dirty="0" smtClean="0">
+                  <a:latin typeface="Times"/>
+                  <a:cs typeface="Times"/>
+                </a:rPr>
+                <a:t>The </a:t>
+              </a:r>
+              <a:r>
+                <a:rPr lang="en-US" sz="1800" dirty="0">
+                  <a:latin typeface="Times"/>
+                  <a:cs typeface="Times"/>
+                </a:rPr>
+                <a:t>l</a:t>
+              </a:r>
+              <a:r>
+                <a:rPr lang="en-US" sz="1800" dirty="0" smtClean="0">
+                  <a:latin typeface="Times"/>
+                  <a:cs typeface="Times"/>
+                </a:rPr>
+                <a:t>eaf litter treatments </a:t>
+              </a:r>
+              <a:r>
+                <a:rPr lang="en-US" sz="1800" dirty="0" smtClean="0">
+                  <a:latin typeface="Times"/>
+                  <a:cs typeface="Times"/>
+                </a:rPr>
+                <a:t>were created by adding 20 leaf disks </a:t>
+              </a:r>
+              <a:r>
+                <a:rPr lang="en-US" sz="1800" dirty="0" smtClean="0">
+                  <a:latin typeface="Times"/>
+                  <a:cs typeface="Times"/>
+                </a:rPr>
+                <a:t>(10 </a:t>
+              </a:r>
+              <a:r>
+                <a:rPr lang="en-US" sz="1800" dirty="0" smtClean="0">
+                  <a:latin typeface="Times"/>
+                  <a:cs typeface="Times"/>
+                </a:rPr>
+                <a:t>mm </a:t>
+              </a:r>
+              <a:r>
+                <a:rPr lang="en-US" sz="1800" dirty="0" smtClean="0">
+                  <a:latin typeface="Times"/>
+                  <a:cs typeface="Times"/>
+                </a:rPr>
+                <a:t>diam.) </a:t>
+              </a:r>
+              <a:r>
+                <a:rPr lang="en-US" sz="1800" dirty="0" smtClean="0">
+                  <a:latin typeface="Times"/>
+                  <a:cs typeface="Times"/>
+                </a:rPr>
+                <a:t>to the BOD </a:t>
+              </a:r>
+              <a:r>
+                <a:rPr lang="en-US" sz="1800" dirty="0" smtClean="0">
+                  <a:latin typeface="Times"/>
+                  <a:cs typeface="Times"/>
+                </a:rPr>
+                <a:t>bottles (Fig. 2)</a:t>
+              </a:r>
+              <a:endParaRPr lang="en-US" sz="1800" dirty="0" smtClean="0">
+                <a:latin typeface="Times"/>
+                <a:cs typeface="Times"/>
+              </a:endParaRPr>
+            </a:p>
+            <a:p>
+              <a:pPr marL="272434" indent="-272434" algn="just">
+                <a:buFont typeface="Arial"/>
+                <a:buChar char="•"/>
+              </a:pPr>
+              <a:r>
+                <a:rPr lang="en-US" sz="1800" dirty="0" smtClean="0">
+                  <a:latin typeface="Times"/>
+                  <a:cs typeface="Times"/>
+                </a:rPr>
+                <a:t>Sediment oxygen demand was determined using the Winkler’s Method (Carpenter 1965</a:t>
+              </a:r>
+              <a:r>
+                <a:rPr lang="en-US" sz="1800" dirty="0" smtClean="0">
+                  <a:latin typeface="Times"/>
+                  <a:cs typeface="Times"/>
+                </a:rPr>
+                <a:t>) on 5 dates.</a:t>
+              </a:r>
+            </a:p>
+            <a:p>
+              <a:pPr marL="272434" indent="-272434" algn="just">
+                <a:buFont typeface="Arial"/>
+                <a:buChar char="•"/>
+              </a:pPr>
+              <a:r>
+                <a:rPr lang="en-US" sz="1800" dirty="0" smtClean="0">
+                  <a:latin typeface="Times"/>
+                  <a:cs typeface="Times"/>
+                </a:rPr>
+                <a:t>The amount of labile organic matter in the overlying water was determined using the ratio of absorbance at 254 and 365 nm from a water sample filtered through a GFF on 5 dates.</a:t>
+              </a:r>
+              <a:endParaRPr lang="en-US" sz="1800" dirty="0">
+                <a:latin typeface="Times"/>
+                <a:cs typeface="Times"/>
+              </a:endParaRPr>
+            </a:p>
+          </p:txBody>
+        </p:sp>
+        <p:sp>
+          <p:nvSpPr>
+            <p:cNvPr id="60" name="Rectangle 59"/>
+            <p:cNvSpPr/>
+            <p:nvPr/>
+          </p:nvSpPr>
+          <p:spPr>
+            <a:xfrm>
+              <a:off x="11785297" y="5769877"/>
+              <a:ext cx="7066402" cy="977350"/>
+            </a:xfrm>
+            <a:prstGeom prst="rect">
+              <a:avLst/>
+            </a:prstGeom>
+            <a:solidFill>
+              <a:schemeClr val="tx2"/>
+            </a:solidFill>
+            <a:effectLst/>
+          </p:spPr>
+          <p:style>
+            <a:lnRef idx="1">
+              <a:schemeClr val="accent1"/>
+            </a:lnRef>
+            <a:fillRef idx="3">
+              <a:schemeClr val="accent1"/>
+            </a:fillRef>
+            <a:effectRef idx="2">
+              <a:schemeClr val="accent1"/>
+            </a:effectRef>
+            <a:fontRef idx="minor">
+              <a:schemeClr val="lt1"/>
+            </a:fontRef>
+          </p:style>
+          <p:txBody>
+            <a:bodyPr rtlCol="0" anchor="ctr"/>
+            <a:lstStyle/>
+            <a:p>
+              <a:pPr algn="ctr"/>
+              <a:r>
+                <a:rPr lang="en-US" sz="5400" dirty="0" smtClean="0"/>
+                <a:t>Methods</a:t>
+              </a:r>
+              <a:endParaRPr lang="en-US" sz="5400" dirty="0"/>
+            </a:p>
+          </p:txBody>
+        </p:sp>
+      </p:grpSp>
+      <p:sp>
+        <p:nvSpPr>
+          <p:cNvPr id="61" name="Rectangle 60"/>
           <p:cNvSpPr/>
           <p:nvPr/>
         </p:nvSpPr>
         <p:spPr>
           <a:xfrm>
-            <a:off x="846134" y="16192773"/>
-            <a:ext cx="8229600" cy="1371600"/>
+            <a:off x="1198334" y="16702316"/>
+            <a:ext cx="7066402" cy="977350"/>
           </a:xfrm>
           <a:prstGeom prst="rect">
             <a:avLst/>
           </a:prstGeom>
+          <a:solidFill>
+            <a:schemeClr val="tx2"/>
+          </a:solidFill>
+          <a:effectLst/>
         </p:spPr>
         <p:style>
           <a:lnRef idx="1">
@@ -4649,27 +5740,31 @@
           <a:p>
             <a:pPr algn="ctr"/>
             <a:r>
-              <a:rPr lang="en-US" dirty="0" smtClean="0"/>
-              <a:t>Background</a:t>
-            </a:r>
-            <a:endParaRPr lang="en-US" dirty="0"/>
-          </a:p>
-        </p:txBody>
-      </p:sp>
-      <p:sp>
-        <p:nvSpPr>
-          <p:cNvPr id="5" name="Rectangle 4"/>
+              <a:rPr lang="en-US" sz="4400" dirty="0" smtClean="0"/>
+              <a:t>Fate of Leaf Litter in Ponds</a:t>
+            </a:r>
+            <a:endParaRPr lang="en-US" sz="4400" dirty="0"/>
+          </a:p>
+        </p:txBody>
+      </p:sp>
+      <p:sp>
+        <p:nvSpPr>
+          <p:cNvPr id="62" name="Rectangle 61"/>
           <p:cNvSpPr/>
           <p:nvPr/>
         </p:nvSpPr>
         <p:spPr>
           <a:xfrm>
-            <a:off x="13558398" y="5664975"/>
-            <a:ext cx="8229600" cy="1371600"/>
+            <a:off x="1364330" y="5769877"/>
+            <a:ext cx="7066402" cy="977350"/>
           </a:xfrm>
           <a:prstGeom prst="rect">
             <a:avLst/>
           </a:prstGeom>
+          <a:solidFill>
+            <a:schemeClr val="tx2"/>
+          </a:solidFill>
+          <a:effectLst/>
         </p:spPr>
         <p:style>
           <a:lnRef idx="1">
@@ -4691,27 +5786,31 @@
           <a:p>
             <a:pPr algn="ctr"/>
             <a:r>
-              <a:rPr lang="en-US" dirty="0" smtClean="0"/>
-              <a:t>Results</a:t>
-            </a:r>
-            <a:endParaRPr lang="en-US" dirty="0"/>
-          </a:p>
-        </p:txBody>
-      </p:sp>
-      <p:sp>
-        <p:nvSpPr>
-          <p:cNvPr id="8" name="Rectangle 7"/>
+              <a:rPr lang="en-US" sz="5400" dirty="0" smtClean="0"/>
+              <a:t>Abstract</a:t>
+            </a:r>
+            <a:endParaRPr lang="en-US" sz="5400" dirty="0"/>
+          </a:p>
+        </p:txBody>
+      </p:sp>
+      <p:sp>
+        <p:nvSpPr>
+          <p:cNvPr id="67" name="Rectangle 66"/>
           <p:cNvSpPr/>
           <p:nvPr/>
         </p:nvSpPr>
         <p:spPr>
           <a:xfrm>
-            <a:off x="27527851" y="10735569"/>
-            <a:ext cx="8229600" cy="1371600"/>
+            <a:off x="11576430" y="7408733"/>
+            <a:ext cx="7066402" cy="977350"/>
           </a:xfrm>
           <a:prstGeom prst="rect">
             <a:avLst/>
           </a:prstGeom>
+          <a:solidFill>
+            <a:schemeClr val="bg1"/>
+          </a:solidFill>
+          <a:effectLst/>
         </p:spPr>
         <p:style>
           <a:lnRef idx="1">
@@ -4733,291 +5832,49 @@
           <a:p>
             <a:pPr algn="ctr"/>
             <a:r>
-              <a:rPr lang="en-US" dirty="0" smtClean="0"/>
-              <a:t>Methods</a:t>
-            </a:r>
-            <a:endParaRPr lang="en-US" dirty="0"/>
-          </a:p>
-        </p:txBody>
-      </p:sp>
-      <p:pic>
-        <p:nvPicPr>
-          <p:cNvPr id="21" name="Picture 20"/>
-          <p:cNvPicPr>
-            <a:picLocks noChangeAspect="1"/>
-          </p:cNvPicPr>
+              <a:rPr lang="en-US" sz="5400" dirty="0" smtClean="0">
+                <a:ln>
+                  <a:solidFill>
+                    <a:schemeClr val="tx2"/>
+                  </a:solidFill>
+                </a:ln>
+                <a:solidFill>
+                  <a:schemeClr val="tx1"/>
+                </a:solidFill>
+              </a:rPr>
+              <a:t>Leaf Litter Effects</a:t>
+            </a:r>
+            <a:endParaRPr lang="en-US" sz="5400" dirty="0">
+              <a:ln>
+                <a:solidFill>
+                  <a:schemeClr val="tx2"/>
+                </a:solidFill>
+              </a:ln>
+              <a:solidFill>
+                <a:schemeClr val="tx1"/>
+              </a:solidFill>
+            </a:endParaRPr>
+          </a:p>
+        </p:txBody>
+      </p:sp>
+      <p:sp>
+        <p:nvSpPr>
+          <p:cNvPr id="69" name="Rectangle 68"/>
+          <p:cNvSpPr/>
           <p:nvPr/>
-        </p:nvPicPr>
-        <p:blipFill>
-          <a:blip r:embed="rId8">
-            <a:extLst>
-              <a:ext uri="{28A0092B-C50C-407E-A947-70E740481C1C}">
-                <a14:useLocalDpi xmlns:a14="http://schemas.microsoft.com/office/drawing/2010/main" val="0"/>
-              </a:ext>
-            </a:extLst>
-          </a:blip>
-          <a:stretch>
-            <a:fillRect/>
-          </a:stretch>
-        </p:blipFill>
+        </p:nvSpPr>
         <p:spPr>
           <a:xfrm>
-            <a:off x="15464690" y="13498114"/>
-            <a:ext cx="6562835" cy="6562835"/>
+            <a:off x="11079918" y="5769876"/>
+            <a:ext cx="25142906" cy="938103"/>
           </a:xfrm>
           <a:prstGeom prst="rect">
             <a:avLst/>
           </a:prstGeom>
-        </p:spPr>
-      </p:pic>
-      <p:pic>
-        <p:nvPicPr>
-          <p:cNvPr id="24" name="Picture 23"/>
-          <p:cNvPicPr>
-            <a:picLocks noChangeAspect="1"/>
-          </p:cNvPicPr>
-          <p:nvPr/>
-        </p:nvPicPr>
-        <p:blipFill>
-          <a:blip r:embed="rId9">
-            <a:extLst>
-              <a:ext uri="{28A0092B-C50C-407E-A947-70E740481C1C}">
-                <a14:useLocalDpi xmlns:a14="http://schemas.microsoft.com/office/drawing/2010/main" val="0"/>
-              </a:ext>
-            </a:extLst>
-          </a:blip>
-          <a:stretch>
-            <a:fillRect/>
-          </a:stretch>
-        </p:blipFill>
-        <p:spPr>
-          <a:xfrm>
-            <a:off x="16385562" y="29210643"/>
-            <a:ext cx="3856973" cy="3856973"/>
-          </a:xfrm>
-          <a:prstGeom prst="rect">
-            <a:avLst/>
-          </a:prstGeom>
-        </p:spPr>
-      </p:pic>
-      <p:sp>
-        <p:nvSpPr>
-          <p:cNvPr id="27" name="TextBox 26"/>
-          <p:cNvSpPr txBox="1"/>
-          <p:nvPr/>
-        </p:nvSpPr>
-        <p:spPr>
-          <a:xfrm>
-            <a:off x="14049823" y="11614408"/>
-            <a:ext cx="9046029" cy="2677656"/>
-          </a:xfrm>
-          <a:prstGeom prst="rect">
-            <a:avLst/>
-          </a:prstGeom>
-          <a:noFill/>
-        </p:spPr>
-        <p:txBody>
-          <a:bodyPr wrap="square" rtlCol="0">
-            <a:spAutoFit/>
-          </a:bodyPr>
-          <a:lstStyle/>
-          <a:p>
-            <a:r>
-              <a:rPr lang="en-US" sz="2400" dirty="0" smtClean="0">
-                <a:latin typeface="Times" panose="02020603050405020304" pitchFamily="18" charset="0"/>
-                <a:cs typeface="Times" panose="02020603050405020304" pitchFamily="18" charset="0"/>
-              </a:rPr>
-              <a:t>Figure 2: A comparison of the sediment oxygen demand in BOD bottles with leaf litter and those without after standardized by the organic matter abundance per bottle. Statistical analyses suggests that CPOM significantly affects sediment oxygen demand (SOD) in a man-made system. In addition, since these results were standardized by their organic matter content, we can see that the type of organic matter is significant.</a:t>
-            </a:r>
-            <a:endParaRPr lang="en-US" sz="2400" dirty="0">
-              <a:latin typeface="Times" panose="02020603050405020304" pitchFamily="18" charset="0"/>
-              <a:cs typeface="Times" panose="02020603050405020304" pitchFamily="18" charset="0"/>
-            </a:endParaRPr>
-          </a:p>
-        </p:txBody>
-      </p:sp>
-      <p:pic>
-        <p:nvPicPr>
-          <p:cNvPr id="29" name="Picture 28"/>
-          <p:cNvPicPr>
-            <a:picLocks noChangeAspect="1"/>
-          </p:cNvPicPr>
-          <p:nvPr/>
-        </p:nvPicPr>
-        <p:blipFill>
-          <a:blip r:embed="rId10">
-            <a:extLst>
-              <a:ext uri="{28A0092B-C50C-407E-A947-70E740481C1C}">
-                <a14:useLocalDpi xmlns:a14="http://schemas.microsoft.com/office/drawing/2010/main" val="0"/>
-              </a:ext>
-            </a:extLst>
-          </a:blip>
-          <a:stretch>
-            <a:fillRect/>
-          </a:stretch>
-        </p:blipFill>
-        <p:spPr>
-          <a:xfrm>
-            <a:off x="15501837" y="6864944"/>
-            <a:ext cx="4969729" cy="4969729"/>
-          </a:xfrm>
-          <a:prstGeom prst="rect">
-            <a:avLst/>
-          </a:prstGeom>
-        </p:spPr>
-      </p:pic>
-      <p:sp>
-        <p:nvSpPr>
-          <p:cNvPr id="31" name="TextBox 30"/>
-          <p:cNvSpPr txBox="1"/>
-          <p:nvPr/>
-        </p:nvSpPr>
-        <p:spPr>
-          <a:xfrm>
-            <a:off x="15006479" y="20002777"/>
-            <a:ext cx="7561600" cy="2677656"/>
-          </a:xfrm>
-          <a:prstGeom prst="rect">
-            <a:avLst/>
-          </a:prstGeom>
-          <a:noFill/>
-        </p:spPr>
-        <p:txBody>
-          <a:bodyPr wrap="square" rtlCol="0">
-            <a:spAutoFit/>
-          </a:bodyPr>
-          <a:lstStyle/>
-          <a:p>
-            <a:r>
-              <a:rPr lang="en-US" sz="2400" dirty="0" smtClean="0">
-                <a:latin typeface="Times" panose="02020603050405020304" pitchFamily="18" charset="0"/>
-                <a:cs typeface="Times" panose="02020603050405020304" pitchFamily="18" charset="0"/>
-              </a:rPr>
-              <a:t>Figure 3: A comparison of the sediment oxygen demand in bottles with leaf litter and those without over the course of the five experiment runs. These results have been standardized by organic matter content in each bottle.  We can see that the bottles containing leaf litter had a spike in SOD on the second run but continued to decline as time went on.</a:t>
-            </a:r>
-            <a:endParaRPr lang="en-US" sz="2400" dirty="0">
-              <a:latin typeface="Times" panose="02020603050405020304" pitchFamily="18" charset="0"/>
-              <a:cs typeface="Times" panose="02020603050405020304" pitchFamily="18" charset="0"/>
-            </a:endParaRPr>
-          </a:p>
-        </p:txBody>
-      </p:sp>
-      <p:sp>
-        <p:nvSpPr>
-          <p:cNvPr id="32" name="TextBox 31"/>
-          <p:cNvSpPr txBox="1"/>
-          <p:nvPr/>
-        </p:nvSpPr>
-        <p:spPr>
-          <a:xfrm>
-            <a:off x="15538629" y="27529992"/>
-            <a:ext cx="7029450" cy="1569660"/>
-          </a:xfrm>
-          <a:prstGeom prst="rect">
-            <a:avLst/>
-          </a:prstGeom>
-          <a:noFill/>
-        </p:spPr>
-        <p:txBody>
-          <a:bodyPr wrap="square" rtlCol="0">
-            <a:spAutoFit/>
-          </a:bodyPr>
-          <a:lstStyle/>
-          <a:p>
-            <a:r>
-              <a:rPr lang="en-US" sz="2400" dirty="0" smtClean="0">
-                <a:latin typeface="Times" panose="02020603050405020304" pitchFamily="18" charset="0"/>
-                <a:cs typeface="Times" panose="02020603050405020304" pitchFamily="18" charset="0"/>
-              </a:rPr>
-              <a:t>Figure 4: A comparison of the SOD in BOD with leaf litter and those without after organic matter standardization. As with the leaf litter, it was found that the nutrient enriched </a:t>
-            </a:r>
-            <a:endParaRPr lang="en-US" sz="2400" dirty="0">
-              <a:latin typeface="Times" panose="02020603050405020304" pitchFamily="18" charset="0"/>
-              <a:cs typeface="Times" panose="02020603050405020304" pitchFamily="18" charset="0"/>
-            </a:endParaRPr>
-          </a:p>
-        </p:txBody>
-      </p:sp>
-      <p:pic>
-        <p:nvPicPr>
-          <p:cNvPr id="34" name="Picture 33"/>
-          <p:cNvPicPr>
-            <a:picLocks noChangeAspect="1"/>
-          </p:cNvPicPr>
-          <p:nvPr/>
-        </p:nvPicPr>
-        <p:blipFill>
-          <a:blip r:embed="rId11">
-            <a:extLst>
-              <a:ext uri="{28A0092B-C50C-407E-A947-70E740481C1C}">
-                <a14:useLocalDpi xmlns:a14="http://schemas.microsoft.com/office/drawing/2010/main" val="0"/>
-              </a:ext>
-            </a:extLst>
-          </a:blip>
-          <a:stretch>
-            <a:fillRect/>
-          </a:stretch>
-        </p:blipFill>
-        <p:spPr>
-          <a:xfrm>
-            <a:off x="16501223" y="22365646"/>
-            <a:ext cx="4572000" cy="4572000"/>
-          </a:xfrm>
-          <a:prstGeom prst="rect">
-            <a:avLst/>
-          </a:prstGeom>
-        </p:spPr>
-      </p:pic>
-      <p:sp>
-        <p:nvSpPr>
-          <p:cNvPr id="35" name="TextBox 34"/>
-          <p:cNvSpPr txBox="1"/>
-          <p:nvPr/>
-        </p:nvSpPr>
-        <p:spPr>
-          <a:xfrm>
-            <a:off x="14664679" y="33949212"/>
-            <a:ext cx="7816319" cy="1200329"/>
-          </a:xfrm>
-          <a:prstGeom prst="rect">
-            <a:avLst/>
-          </a:prstGeom>
-          <a:noFill/>
-        </p:spPr>
-        <p:txBody>
-          <a:bodyPr wrap="square" rtlCol="0">
-            <a:spAutoFit/>
-          </a:bodyPr>
-          <a:lstStyle/>
-          <a:p>
-            <a:r>
-              <a:rPr lang="en-US" sz="2400" dirty="0" smtClean="0">
-                <a:latin typeface="Times" panose="02020603050405020304" pitchFamily="18" charset="0"/>
-                <a:cs typeface="Times" panose="02020603050405020304" pitchFamily="18" charset="0"/>
-              </a:rPr>
-              <a:t>Figure 5: A plot of the SOD data collected from BOD bottles with and without nutrient enrichment over the course of the five experiment runs. </a:t>
-            </a:r>
-            <a:endParaRPr lang="en-US" sz="2400" dirty="0">
-              <a:latin typeface="Times" panose="02020603050405020304" pitchFamily="18" charset="0"/>
-              <a:cs typeface="Times" panose="02020603050405020304" pitchFamily="18" charset="0"/>
-            </a:endParaRPr>
-          </a:p>
-        </p:txBody>
-      </p:sp>
-      <p:sp>
-        <p:nvSpPr>
-          <p:cNvPr id="38" name="Rectangle 37"/>
-          <p:cNvSpPr/>
-          <p:nvPr/>
-        </p:nvSpPr>
-        <p:spPr>
-          <a:xfrm>
-            <a:off x="799249" y="29336347"/>
-            <a:ext cx="8229600" cy="1371600"/>
-          </a:xfrm>
-          <a:prstGeom prst="rect">
-            <a:avLst/>
-          </a:prstGeom>
+          <a:solidFill>
+            <a:schemeClr val="tx2"/>
+          </a:solidFill>
+          <a:effectLst/>
         </p:spPr>
         <p:style>
           <a:lnRef idx="1">
@@ -5039,27 +5896,31 @@
           <a:p>
             <a:pPr algn="ctr"/>
             <a:r>
-              <a:rPr lang="en-US" dirty="0" smtClean="0"/>
-              <a:t>Literature Cited</a:t>
-            </a:r>
-            <a:endParaRPr lang="en-US" dirty="0"/>
-          </a:p>
-        </p:txBody>
-      </p:sp>
-      <p:sp>
-        <p:nvSpPr>
-          <p:cNvPr id="41" name="Rectangle 40"/>
+              <a:rPr lang="en-US" sz="5400" dirty="0" smtClean="0"/>
+              <a:t>Results</a:t>
+            </a:r>
+            <a:endParaRPr lang="en-US" sz="5400" dirty="0"/>
+          </a:p>
+        </p:txBody>
+      </p:sp>
+      <p:sp>
+        <p:nvSpPr>
+          <p:cNvPr id="70" name="Rectangle 69"/>
           <p:cNvSpPr/>
           <p:nvPr/>
         </p:nvSpPr>
         <p:spPr>
           <a:xfrm>
-            <a:off x="26539293" y="28090114"/>
-            <a:ext cx="8229600" cy="1371600"/>
+            <a:off x="21088236" y="7379693"/>
+            <a:ext cx="7066402" cy="977350"/>
           </a:xfrm>
           <a:prstGeom prst="rect">
             <a:avLst/>
           </a:prstGeom>
+          <a:solidFill>
+            <a:schemeClr val="bg1"/>
+          </a:solidFill>
+          <a:effectLst/>
         </p:spPr>
         <p:style>
           <a:lnRef idx="1">
@@ -5081,27 +5942,49 @@
           <a:p>
             <a:pPr algn="ctr"/>
             <a:r>
-              <a:rPr lang="en-US" dirty="0" smtClean="0"/>
-              <a:t>Conclusions</a:t>
-            </a:r>
-            <a:endParaRPr lang="en-US" dirty="0"/>
-          </a:p>
-        </p:txBody>
-      </p:sp>
-      <p:sp>
-        <p:nvSpPr>
-          <p:cNvPr id="42" name="Rectangle 41"/>
+              <a:rPr lang="en-US" sz="5400" dirty="0" smtClean="0">
+                <a:ln>
+                  <a:solidFill>
+                    <a:schemeClr val="tx2"/>
+                  </a:solidFill>
+                </a:ln>
+                <a:solidFill>
+                  <a:schemeClr val="tx1"/>
+                </a:solidFill>
+              </a:rPr>
+              <a:t>Nutrient Effects</a:t>
+            </a:r>
+            <a:endParaRPr lang="en-US" sz="5400" dirty="0">
+              <a:ln>
+                <a:solidFill>
+                  <a:schemeClr val="tx2"/>
+                </a:solidFill>
+              </a:ln>
+              <a:solidFill>
+                <a:schemeClr val="tx1"/>
+              </a:solidFill>
+            </a:endParaRPr>
+          </a:p>
+        </p:txBody>
+      </p:sp>
+      <p:sp>
+        <p:nvSpPr>
+          <p:cNvPr id="71" name="Rectangle 70"/>
           <p:cNvSpPr/>
           <p:nvPr/>
         </p:nvSpPr>
         <p:spPr>
           <a:xfrm>
-            <a:off x="787461" y="33470500"/>
-            <a:ext cx="8229600" cy="1369651"/>
+            <a:off x="29360508" y="7340096"/>
+            <a:ext cx="7066402" cy="977350"/>
           </a:xfrm>
           <a:prstGeom prst="rect">
             <a:avLst/>
           </a:prstGeom>
+          <a:solidFill>
+            <a:schemeClr val="bg1"/>
+          </a:solidFill>
+          <a:effectLst/>
         </p:spPr>
         <p:style>
           <a:lnRef idx="1">
@@ -5123,140 +6006,329 @@
           <a:p>
             <a:pPr algn="ctr"/>
             <a:r>
-              <a:rPr lang="en-US" dirty="0" smtClean="0"/>
-              <a:t>Acknowledgments</a:t>
-            </a:r>
-            <a:endParaRPr lang="en-US" dirty="0"/>
-          </a:p>
-        </p:txBody>
-      </p:sp>
-      <p:grpSp>
-        <p:nvGrpSpPr>
-          <p:cNvPr id="49" name="Group 48"/>
-          <p:cNvGrpSpPr/>
+              <a:rPr lang="en-US" sz="5400" dirty="0" smtClean="0">
+                <a:ln>
+                  <a:solidFill>
+                    <a:schemeClr val="tx2"/>
+                  </a:solidFill>
+                </a:ln>
+                <a:solidFill>
+                  <a:schemeClr val="tx1"/>
+                </a:solidFill>
+              </a:rPr>
+              <a:t>Effects on OM Quality</a:t>
+            </a:r>
+            <a:endParaRPr lang="en-US" sz="5400" dirty="0">
+              <a:ln>
+                <a:solidFill>
+                  <a:schemeClr val="tx2"/>
+                </a:solidFill>
+              </a:ln>
+              <a:solidFill>
+                <a:schemeClr val="tx1"/>
+              </a:solidFill>
+            </a:endParaRPr>
+          </a:p>
+        </p:txBody>
+      </p:sp>
+      <p:sp>
+        <p:nvSpPr>
+          <p:cNvPr id="72" name="TextBox 71"/>
+          <p:cNvSpPr txBox="1"/>
           <p:nvPr/>
-        </p:nvGrpSpPr>
-        <p:grpSpPr>
+        </p:nvSpPr>
+        <p:spPr>
           <a:xfrm>
-            <a:off x="26539293" y="23593562"/>
-            <a:ext cx="10890348" cy="3932923"/>
-            <a:chOff x="26248152" y="18090567"/>
-            <a:chExt cx="10890348" cy="3932923"/>
+            <a:off x="28729713" y="16561220"/>
+            <a:ext cx="7983437" cy="1938992"/>
           </a:xfrm>
-        </p:grpSpPr>
-        <p:pic>
-          <p:nvPicPr>
-            <p:cNvPr id="1029" name="Picture 5"/>
-            <p:cNvPicPr>
-              <a:picLocks noChangeAspect="1" noChangeArrowheads="1"/>
-            </p:cNvPicPr>
-            <p:nvPr/>
-          </p:nvPicPr>
-          <p:blipFill>
-            <a:blip r:embed="rId12"/>
-            <a:srcRect/>
-            <a:stretch>
-              <a:fillRect/>
-            </a:stretch>
-          </p:blipFill>
-          <p:spPr bwMode="auto">
-            <a:xfrm>
-              <a:off x="32014486" y="18417376"/>
-              <a:ext cx="3547524" cy="2109597"/>
-            </a:xfrm>
-            <a:prstGeom prst="rect">
-              <a:avLst/>
-            </a:prstGeom>
-            <a:noFill/>
-            <a:ln w="9525">
-              <a:noFill/>
-              <a:miter lim="800000"/>
-              <a:headEnd/>
-              <a:tailEnd/>
-            </a:ln>
-          </p:spPr>
-        </p:pic>
-        <p:pic>
-          <p:nvPicPr>
-            <p:cNvPr id="20" name="Picture 19"/>
-            <p:cNvPicPr>
-              <a:picLocks noChangeAspect="1"/>
-            </p:cNvPicPr>
-            <p:nvPr/>
-          </p:nvPicPr>
-          <p:blipFill>
-            <a:blip r:embed="rId13">
-              <a:extLst>
-                <a:ext uri="{28A0092B-C50C-407E-A947-70E740481C1C}">
-                  <a14:useLocalDpi xmlns:a14="http://schemas.microsoft.com/office/drawing/2010/main" val="0"/>
-                </a:ext>
-              </a:extLst>
-            </a:blip>
-            <a:stretch>
-              <a:fillRect/>
-            </a:stretch>
-          </p:blipFill>
-          <p:spPr>
-            <a:xfrm>
-              <a:off x="26742825" y="18090567"/>
-              <a:ext cx="3513001" cy="2364321"/>
-            </a:xfrm>
-            <a:prstGeom prst="rect">
-              <a:avLst/>
-            </a:prstGeom>
-          </p:spPr>
-        </p:pic>
-        <p:sp>
-          <p:nvSpPr>
-            <p:cNvPr id="47" name="TextBox 46"/>
-            <p:cNvSpPr txBox="1"/>
-            <p:nvPr/>
-          </p:nvSpPr>
-          <p:spPr>
-            <a:xfrm>
-              <a:off x="26248152" y="21192493"/>
-              <a:ext cx="10890348" cy="830997"/>
-            </a:xfrm>
-            <a:prstGeom prst="rect">
-              <a:avLst/>
-            </a:prstGeom>
-            <a:noFill/>
-          </p:spPr>
-          <p:txBody>
-            <a:bodyPr wrap="square" rtlCol="0">
-              <a:spAutoFit/>
-            </a:bodyPr>
-            <a:lstStyle/>
-            <a:p>
-              <a:r>
-                <a:rPr lang="en-US" sz="2400" dirty="0" smtClean="0">
-                  <a:latin typeface="Times" panose="02020603050405020304" pitchFamily="18" charset="0"/>
-                  <a:cs typeface="Times" panose="02020603050405020304" pitchFamily="18" charset="0"/>
-                </a:rPr>
-                <a:t>Figure 7: Landscape and aerial views of Lancer Park Pond (LPP). LPP is a </a:t>
-              </a:r>
-              <a:r>
-                <a:rPr lang="en-US" sz="2400" dirty="0" err="1" smtClean="0">
-                  <a:latin typeface="Times" panose="02020603050405020304" pitchFamily="18" charset="0"/>
-                  <a:cs typeface="Times" panose="02020603050405020304" pitchFamily="18" charset="0"/>
-                </a:rPr>
-                <a:t>stormwater</a:t>
-              </a:r>
-              <a:r>
-                <a:rPr lang="en-US" sz="2400" dirty="0" smtClean="0">
-                  <a:latin typeface="Times" panose="02020603050405020304" pitchFamily="18" charset="0"/>
-                  <a:cs typeface="Times" panose="02020603050405020304" pitchFamily="18" charset="0"/>
-                </a:rPr>
-                <a:t> pond with a surface area of 0.06 ha and a maximum depth of 1.5m. </a:t>
-              </a:r>
-              <a:endParaRPr lang="en-US" sz="2400" dirty="0">
+          <a:prstGeom prst="rect">
+            <a:avLst/>
+          </a:prstGeom>
+          <a:noFill/>
+        </p:spPr>
+        <p:txBody>
+          <a:bodyPr wrap="square" rtlCol="0">
+            <a:spAutoFit/>
+          </a:bodyPr>
+          <a:lstStyle/>
+          <a:p>
+            <a:r>
+              <a:rPr lang="en-US" sz="2400" dirty="0" smtClean="0">
                 <a:latin typeface="Times" panose="02020603050405020304" pitchFamily="18" charset="0"/>
                 <a:cs typeface="Times" panose="02020603050405020304" pitchFamily="18" charset="0"/>
-              </a:endParaRPr>
-            </a:p>
-          </p:txBody>
-        </p:sp>
-      </p:grpSp>
+              </a:rPr>
+              <a:t>A </a:t>
+            </a:r>
+            <a:r>
+              <a:rPr lang="en-US" sz="2400" dirty="0" smtClean="0">
+                <a:latin typeface="Times" panose="02020603050405020304" pitchFamily="18" charset="0"/>
+                <a:cs typeface="Times" panose="02020603050405020304" pitchFamily="18" charset="0"/>
+              </a:rPr>
+              <a:t>comparison of the </a:t>
+            </a:r>
+            <a:r>
+              <a:rPr lang="en-US" sz="2400" dirty="0" smtClean="0">
+                <a:latin typeface="Times" panose="02020603050405020304" pitchFamily="18" charset="0"/>
+                <a:cs typeface="Times" panose="02020603050405020304" pitchFamily="18" charset="0"/>
+              </a:rPr>
+              <a:t>amount of labile dissolved organic matter over time in BOD bottles with and withou</a:t>
+            </a:r>
+            <a:r>
+              <a:rPr lang="en-US" sz="2400" dirty="0" smtClean="0">
+                <a:latin typeface="Times" panose="02020603050405020304" pitchFamily="18" charset="0"/>
+                <a:cs typeface="Times" panose="02020603050405020304" pitchFamily="18" charset="0"/>
+              </a:rPr>
+              <a:t>t leaf litter. The leaf litter resulted in an initial increase in the amount of labile dissolved organic matter but this effect did not persist past the first week of incubation,</a:t>
+            </a:r>
+            <a:endParaRPr lang="en-US" sz="2400" dirty="0">
+              <a:latin typeface="Times" panose="02020603050405020304" pitchFamily="18" charset="0"/>
+              <a:cs typeface="Times" panose="02020603050405020304" pitchFamily="18" charset="0"/>
+            </a:endParaRPr>
+          </a:p>
+        </p:txBody>
+      </p:sp>
+      <p:sp>
+        <p:nvSpPr>
+          <p:cNvPr id="74" name="TextBox 73"/>
+          <p:cNvSpPr txBox="1">
+            <a:spLocks noChangeAspect="1"/>
+          </p:cNvSpPr>
+          <p:nvPr/>
+        </p:nvSpPr>
+        <p:spPr>
+          <a:xfrm>
+            <a:off x="21379779" y="31281489"/>
+            <a:ext cx="6483315" cy="2242465"/>
+          </a:xfrm>
+          <a:prstGeom prst="rect">
+            <a:avLst/>
+          </a:prstGeom>
+          <a:noFill/>
+        </p:spPr>
+        <p:txBody>
+          <a:bodyPr wrap="square" lIns="87179" tIns="43589" rIns="87179" bIns="43589" rtlCol="0">
+            <a:spAutoFit/>
+          </a:bodyPr>
+          <a:lstStyle/>
+          <a:p>
+            <a:r>
+              <a:rPr lang="en-US" sz="2000" dirty="0">
+                <a:latin typeface="Times New Roman"/>
+                <a:cs typeface="Times New Roman"/>
+              </a:rPr>
+              <a:t>Carpenter, J. H., 1965. The Chesapeake Bay Institute technique for the Winkler dissolved oxygen method. Limnology and Oceanography 10:144-143</a:t>
+            </a:r>
+            <a:r>
+              <a:rPr lang="en-US" sz="2000" dirty="0" smtClean="0">
+                <a:latin typeface="Times New Roman"/>
+                <a:cs typeface="Times New Roman"/>
+              </a:rPr>
+              <a:t>.</a:t>
+            </a:r>
+          </a:p>
+          <a:p>
+            <a:endParaRPr lang="en-US" sz="2000" dirty="0" smtClean="0">
+              <a:latin typeface="Times New Roman"/>
+              <a:cs typeface="Times New Roman"/>
+            </a:endParaRPr>
+          </a:p>
+          <a:p>
+            <a:r>
+              <a:rPr lang="en-US" sz="2000" dirty="0" err="1">
+                <a:latin typeface="Times New Roman"/>
+                <a:cs typeface="Times New Roman"/>
+              </a:rPr>
+              <a:t>Gessner</a:t>
+            </a:r>
+            <a:r>
+              <a:rPr lang="en-US" sz="2000" dirty="0">
+                <a:latin typeface="Times New Roman"/>
+                <a:cs typeface="Times New Roman"/>
+              </a:rPr>
+              <a:t>, M. O., </a:t>
+            </a:r>
+            <a:r>
+              <a:rPr lang="en-US" sz="2000" dirty="0" err="1">
+                <a:latin typeface="Times New Roman"/>
+                <a:cs typeface="Times New Roman"/>
+              </a:rPr>
+              <a:t>Chauvet</a:t>
+            </a:r>
+            <a:r>
+              <a:rPr lang="en-US" sz="2000" dirty="0">
+                <a:latin typeface="Times New Roman"/>
+                <a:cs typeface="Times New Roman"/>
+              </a:rPr>
+              <a:t>, E., and Dobson, M. 1999. A perspective on leaf litter breakdown in streams. </a:t>
+            </a:r>
+            <a:r>
+              <a:rPr lang="en-US" sz="2000" dirty="0" err="1">
+                <a:latin typeface="Times New Roman"/>
+                <a:cs typeface="Times New Roman"/>
+              </a:rPr>
+              <a:t>Oikos</a:t>
+            </a:r>
+            <a:r>
+              <a:rPr lang="en-US" sz="2000" dirty="0">
+                <a:latin typeface="Times New Roman"/>
+                <a:cs typeface="Times New Roman"/>
+              </a:rPr>
+              <a:t> 85:377-384. </a:t>
+            </a:r>
+            <a:endParaRPr lang="en-US" sz="2000" dirty="0">
+              <a:latin typeface="Times New Roman"/>
+              <a:cs typeface="Times New Roman"/>
+            </a:endParaRPr>
+          </a:p>
+        </p:txBody>
+      </p:sp>
+      <p:sp>
+        <p:nvSpPr>
+          <p:cNvPr id="75" name="Rectangle 74"/>
+          <p:cNvSpPr/>
+          <p:nvPr/>
+        </p:nvSpPr>
+        <p:spPr>
+          <a:xfrm>
+            <a:off x="21088236" y="29735725"/>
+            <a:ext cx="7066402" cy="977350"/>
+          </a:xfrm>
+          <a:prstGeom prst="rect">
+            <a:avLst/>
+          </a:prstGeom>
+          <a:solidFill>
+            <a:schemeClr val="tx2"/>
+          </a:solidFill>
+          <a:effectLst/>
+        </p:spPr>
+        <p:style>
+          <a:lnRef idx="1">
+            <a:schemeClr val="accent1"/>
+          </a:lnRef>
+          <a:fillRef idx="3">
+            <a:schemeClr val="accent1"/>
+          </a:fillRef>
+          <a:effectRef idx="2">
+            <a:schemeClr val="accent1"/>
+          </a:effectRef>
+          <a:fontRef idx="minor">
+            <a:schemeClr val="lt1"/>
+          </a:fontRef>
+        </p:style>
+        <p:txBody>
+          <a:bodyPr rtlCol="0" anchor="ctr"/>
+          <a:lstStyle/>
+          <a:p>
+            <a:pPr algn="ctr"/>
+            <a:r>
+              <a:rPr lang="en-US" sz="5400" dirty="0" smtClean="0"/>
+              <a:t>Literature Cited</a:t>
+            </a:r>
+            <a:endParaRPr lang="en-US" sz="5400" dirty="0"/>
+          </a:p>
+        </p:txBody>
+      </p:sp>
+      <p:sp>
+        <p:nvSpPr>
+          <p:cNvPr id="76" name="TextBox 75"/>
+          <p:cNvSpPr txBox="1">
+            <a:spLocks noChangeAspect="1"/>
+          </p:cNvSpPr>
+          <p:nvPr/>
+        </p:nvSpPr>
+        <p:spPr>
+          <a:xfrm>
+            <a:off x="29652051" y="31281489"/>
+            <a:ext cx="6483315" cy="2550242"/>
+          </a:xfrm>
+          <a:prstGeom prst="rect">
+            <a:avLst/>
+          </a:prstGeom>
+          <a:noFill/>
+        </p:spPr>
+        <p:txBody>
+          <a:bodyPr wrap="square" lIns="87179" tIns="43589" rIns="87179" bIns="43589" rtlCol="0">
+            <a:spAutoFit/>
+          </a:bodyPr>
+          <a:lstStyle/>
+          <a:p>
+            <a:r>
+              <a:rPr lang="en-US" sz="2000" dirty="0">
+                <a:latin typeface="Times New Roman" pitchFamily="18" charset="0"/>
+                <a:cs typeface="Times New Roman" pitchFamily="18" charset="0"/>
+              </a:rPr>
+              <a:t>We would like to thank Longwood University, the Longwood Real Estate Foundation, the Town of Farmville, and </a:t>
+            </a:r>
+            <a:r>
+              <a:rPr lang="en-US" sz="2000" dirty="0" err="1">
+                <a:latin typeface="Times New Roman" pitchFamily="18" charset="0"/>
+                <a:cs typeface="Times New Roman" pitchFamily="18" charset="0"/>
+              </a:rPr>
+              <a:t>Daulton</a:t>
+            </a:r>
+            <a:r>
+              <a:rPr lang="en-US" sz="2000" dirty="0">
+                <a:latin typeface="Times New Roman" pitchFamily="18" charset="0"/>
+                <a:cs typeface="Times New Roman" pitchFamily="18" charset="0"/>
+              </a:rPr>
+              <a:t> Farm for permission to sample the ponds. We would also like to thank the Longwood University PRISM program, the Longwood University Department of Biological and Environmental Sciences and the Cook Cole College of Arts and Sciences for funding. </a:t>
+            </a:r>
+          </a:p>
+          <a:p>
+            <a:endParaRPr lang="en-US" sz="2000" dirty="0">
+              <a:latin typeface="Times New Roman"/>
+              <a:cs typeface="Times New Roman"/>
+            </a:endParaRPr>
+          </a:p>
+        </p:txBody>
+      </p:sp>
+      <p:sp>
+        <p:nvSpPr>
+          <p:cNvPr id="77" name="Rectangle 76"/>
+          <p:cNvSpPr/>
+          <p:nvPr/>
+        </p:nvSpPr>
+        <p:spPr>
+          <a:xfrm>
+            <a:off x="29360508" y="29735725"/>
+            <a:ext cx="7066402" cy="977350"/>
+          </a:xfrm>
+          <a:prstGeom prst="rect">
+            <a:avLst/>
+          </a:prstGeom>
+          <a:solidFill>
+            <a:schemeClr val="tx2"/>
+          </a:solidFill>
+          <a:effectLst/>
+        </p:spPr>
+        <p:style>
+          <a:lnRef idx="1">
+            <a:schemeClr val="accent1"/>
+          </a:lnRef>
+          <a:fillRef idx="3">
+            <a:schemeClr val="accent1"/>
+          </a:fillRef>
+          <a:effectRef idx="2">
+            <a:schemeClr val="accent1"/>
+          </a:effectRef>
+          <a:fontRef idx="minor">
+            <a:schemeClr val="lt1"/>
+          </a:fontRef>
+        </p:style>
+        <p:txBody>
+          <a:bodyPr rtlCol="0" anchor="ctr"/>
+          <a:lstStyle/>
+          <a:p>
+            <a:pPr algn="ctr"/>
+            <a:r>
+              <a:rPr lang="en-US" sz="5400" dirty="0" smtClean="0"/>
+              <a:t>Acknowledgements </a:t>
+            </a:r>
+            <a:endParaRPr lang="en-US" sz="5400" dirty="0"/>
+          </a:p>
+        </p:txBody>
+      </p:sp>
     </p:spTree>
     <p:extLst>
       <p:ext uri="{BB962C8B-B14F-4D97-AF65-F5344CB8AC3E}">
@@ -5270,7 +6342,7 @@
   <p:timing>
     <p:tnLst>
       <p:par>
-        <p:cTn id="1" dur="indefinite" restart="never" nodeType="tmRoot"/>
+        <p:cTn xmlns:p14="http://schemas.microsoft.com/office/powerpoint/2010/main" id="1" dur="indefinite" restart="never" nodeType="tmRoot"/>
       </p:par>
     </p:tnLst>
   </p:timing>

</xml_diff>